<commit_message>
Generate PDF from docx and pptx
</commit_message>
<xml_diff>
--- a/docgen/output.pptx
+++ b/docgen/output.pptx
@@ -1,12 +1,14 @@
 
 <file path=ppt/presentation.xml><?xml version="1.0" encoding="utf-8"?>
-<p:presentation xmlns:p="http://schemas.openxmlformats.org/presentationml/2006/main" xmlns:r="http://schemas.openxmlformats.org/officeDocument/2006/relationships" xmlns:a="http://schemas.openxmlformats.org/drawingml/2006/main" xmlns:mc="http://schemas.openxmlformats.org/markup-compatibility/2006" xmlns:c="http://schemas.openxmlformats.org/drawingml/2006/chart" xmlns:cdr="http://schemas.openxmlformats.org/drawingml/2006/chartDrawing" xmlns:c14="http://schemas.microsoft.com/office/drawing/2007/8/2/chart" xmlns:dgm="http://schemas.openxmlformats.org/drawingml/2006/diagram" xmlns:pic="http://schemas.openxmlformats.org/drawingml/2006/picture" xmlns:wp="http://schemas.openxmlformats.org/drawingml/2006/wordprocessingDrawing" xmlns:wp14="http://schemas.microsoft.com/office/word/2010/wordprocessingDrawing" xmlns:xdr="http://schemas.openxmlformats.org/drawingml/2006/spreadsheetDrawing" xmlns:dsp="http://schemas.microsoft.com/office/drawing/2008/diagram" xmlns:p14="http://schemas.microsoft.com/office/powerpoint/2010/main" xmlns:a14="http://schemas.microsoft.com/office/drawing/2010/main" xmlns:p15="http://schemas.microsoft.com/office/powerpoint/2012/main" xmlns:p166="http://schemas.microsoft.com/office/powerpoint/2016/6/main" xmlns:a13cmd="http://schemas.microsoft.com/office/drawing/2013/main/command" xmlns:p13cmd="http://schemas.microsoft.com/office/powerpoint/2013/main/command" xmlns:p1510="http://schemas.microsoft.com/office/powerpoint/2015/10/main" xmlns:psez="http://schemas.microsoft.com/office/powerpoint/2016/sectionzoom" xmlns:pslz="http://schemas.microsoft.com/office/powerpoint/2016/slidezoom" xmlns:psuz="http://schemas.microsoft.com/office/powerpoint/2016/summaryzoom" xmlns:p173="http://schemas.microsoft.com/office/powerpoint/2017/3/main" xmlns:b="http://schemas.openxmlformats.org/officeDocument/2006/bibliography" xmlns:msink="http://schemas.microsoft.com/ink/2010/main" xmlns:cdr14="http://schemas.microsoft.com/office/drawing/2010/chartDrawing" xmlns:c15="http://schemas.microsoft.com/office/drawing/2012/chart" xmlns:cs="http://schemas.microsoft.com/office/drawing/2012/chartStyle" xmlns:ns30="http://www.w3.org/1998/Math/MathML" xmlns:ns31="http://www.w3.org/2003/InkML" xmlns:cx="http://schemas.microsoft.com/office/drawing/2014/chartex" xmlns:c16="http://schemas.microsoft.com/office/drawing/2014/chart" xmlns:dgm1611="http://schemas.microsoft.com/office/drawing/2016/11/diagram" xmlns:c173="http://schemas.microsoft.com/office/drawing/2017/03/chart" xmlns:am3d="http://schemas.microsoft.com/office/drawing/2017/model3d" xmlns:an18="http://schemas.microsoft.com/office/drawing/2018/animation" xmlns:anam3d="http://schemas.microsoft.com/office/drawing/2018/animation/model3d" xmlns:iact="http://schemas.microsoft.com/office/powerpoint/2014/inkAction" xmlns:thm15="http://schemas.microsoft.com/office/thememl/2012/main" xmlns:wetp="http://schemas.microsoft.com/office/webextensions/taskpanes/2010/11" xmlns:we="http://schemas.microsoft.com/office/webextensions/webextension/2010/11" xmlns:comp="http://schemas.openxmlformats.org/drawingml/2006/compatibility" xmlns:lc="http://schemas.openxmlformats.org/drawingml/2006/lockedCanvas" xmlns:p159="http://schemas.microsoft.com/office/powerpoint/2015/09/main" xmlns:p16="http://schemas.microsoft.com/office/powerpoint/2015/main" xmlns:p1710="http://schemas.microsoft.com/office/powerpoint/2017/10/main" xmlns:p184="http://schemas.microsoft.com/office/powerpoint/2018/4/main" xmlns:dgm14="http://schemas.microsoft.com/office/drawing/2010/diagram" xmlns:a15="http://schemas.microsoft.com/office/drawing/2012/main" xmlns:pic14="http://schemas.microsoft.com/office/drawing/2010/picture" xmlns:c16ac="http://schemas.microsoft.com/office/drawing/2014/chart/ac" xmlns:a16="http://schemas.microsoft.com/office/drawing/2014/main" xmlns:a1611="http://schemas.microsoft.com/office/drawing/2016/11/main" xmlns:dgm1612="http://schemas.microsoft.com/office/drawing/2016/12/diagram" xmlns:a16svg="http://schemas.microsoft.com/office/drawing/2016/SVG/main" xmlns:adec="http://schemas.microsoft.com/office/drawing/2017/decorative" xmlns:a18hc="http://schemas.microsoft.com/office/drawing/2018/hyperlinkcolor" saveSubsetFonts="true" autoCompressPictures="false">
+<p:presentation xmlns:r="http://schemas.openxmlformats.org/officeDocument/2006/relationships" xmlns:a="http://schemas.openxmlformats.org/drawingml/2006/main" xmlns:p="http://schemas.openxmlformats.org/presentationml/2006/main" xmlns:mc="http://schemas.openxmlformats.org/markup-compatibility/2006" xmlns:c="http://schemas.openxmlformats.org/drawingml/2006/chart" xmlns:cdr="http://schemas.openxmlformats.org/drawingml/2006/chartDrawing" xmlns:c14="http://schemas.microsoft.com/office/drawing/2007/8/2/chart" xmlns:dgm="http://schemas.openxmlformats.org/drawingml/2006/diagram" xmlns:pic="http://schemas.openxmlformats.org/drawingml/2006/picture" xmlns:wp="http://schemas.openxmlformats.org/drawingml/2006/wordprocessingDrawing" xmlns:wp14="http://schemas.microsoft.com/office/word/2010/wordprocessingDrawing" xmlns:xdr="http://schemas.openxmlformats.org/drawingml/2006/spreadsheetDrawing" xmlns:dsp="http://schemas.microsoft.com/office/drawing/2008/diagram" xmlns:p14="http://schemas.microsoft.com/office/powerpoint/2010/main" xmlns:a14="http://schemas.microsoft.com/office/drawing/2010/main" xmlns:p15="http://schemas.microsoft.com/office/powerpoint/2012/main" xmlns:p166="http://schemas.microsoft.com/office/powerpoint/2016/6/main" xmlns:a13cmd="http://schemas.microsoft.com/office/drawing/2013/main/command" xmlns:p13cmd="http://schemas.microsoft.com/office/powerpoint/2013/main/command" xmlns:p1510="http://schemas.microsoft.com/office/powerpoint/2015/10/main" xmlns:psez="http://schemas.microsoft.com/office/powerpoint/2016/sectionzoom" xmlns:pslz="http://schemas.microsoft.com/office/powerpoint/2016/slidezoom" xmlns:psuz="http://schemas.microsoft.com/office/powerpoint/2016/summaryzoom" xmlns:p173="http://schemas.microsoft.com/office/powerpoint/2017/3/main" xmlns:b="http://schemas.openxmlformats.org/officeDocument/2006/bibliography" xmlns:msink="http://schemas.microsoft.com/ink/2010/main" xmlns:cdr14="http://schemas.microsoft.com/office/drawing/2010/chartDrawing" xmlns:c15="http://schemas.microsoft.com/office/drawing/2012/chart" xmlns:cs="http://schemas.microsoft.com/office/drawing/2012/chartStyle" xmlns:ns30="http://www.w3.org/1998/Math/MathML" xmlns:ns31="http://www.w3.org/2003/InkML" xmlns:cx="http://schemas.microsoft.com/office/drawing/2014/chartex" xmlns:c16="http://schemas.microsoft.com/office/drawing/2014/chart" xmlns:dgm1611="http://schemas.microsoft.com/office/drawing/2016/11/diagram" xmlns:c173="http://schemas.microsoft.com/office/drawing/2017/03/chart" xmlns:am3d="http://schemas.microsoft.com/office/drawing/2017/model3d" xmlns:an18="http://schemas.microsoft.com/office/drawing/2018/animation" xmlns:anam3d="http://schemas.microsoft.com/office/drawing/2018/animation/model3d" xmlns:iact="http://schemas.microsoft.com/office/powerpoint/2014/inkAction" xmlns:thm15="http://schemas.microsoft.com/office/thememl/2012/main" xmlns:wetp="http://schemas.microsoft.com/office/webextensions/taskpanes/2010/11" xmlns:we="http://schemas.microsoft.com/office/webextensions/webextension/2010/11" xmlns:comp="http://schemas.openxmlformats.org/drawingml/2006/compatibility" xmlns:lc="http://schemas.openxmlformats.org/drawingml/2006/lockedCanvas" xmlns:p159="http://schemas.microsoft.com/office/powerpoint/2015/09/main" xmlns:p16="http://schemas.microsoft.com/office/powerpoint/2015/main" xmlns:p1710="http://schemas.microsoft.com/office/powerpoint/2017/10/main" xmlns:p184="http://schemas.microsoft.com/office/powerpoint/2018/4/main" xmlns:dgm14="http://schemas.microsoft.com/office/drawing/2010/diagram" xmlns:a15="http://schemas.microsoft.com/office/drawing/2012/main" xmlns:pic14="http://schemas.microsoft.com/office/drawing/2010/picture" xmlns:c16ac="http://schemas.microsoft.com/office/drawing/2014/chart/ac" xmlns:a16="http://schemas.microsoft.com/office/drawing/2014/main" xmlns:a1611="http://schemas.microsoft.com/office/drawing/2016/11/main" xmlns:dgm1612="http://schemas.microsoft.com/office/drawing/2016/12/diagram" xmlns:a16svg="http://schemas.microsoft.com/office/drawing/2016/SVG/main" xmlns:adec="http://schemas.microsoft.com/office/drawing/2017/decorative" xmlns:a18hc="http://schemas.microsoft.com/office/drawing/2018/hyperlinkcolor" saveSubsetFonts="true" autoCompressPictures="false">
   <p:sldMasterIdLst>
     <p:sldMasterId id="2147483660" r:id="rId1"/>
   </p:sldMasterIdLst>
   <p:sldIdLst>
     <p:sldId id="256" r:id="rId2"/>
     <p:sldId id="257" r:id="rId3"/>
+    <p:sldId id="259" r:id="rId4"/>
+    <p:sldId id="258" r:id="rId5"/>
   </p:sldIdLst>
   <p:sldSz cx="12192000" cy="6858000"/>
   <p:notesSz cx="6858000" cy="9144000"/>
@@ -105,6 +107,11 @@
       </a:defRPr>
     </a:lvl9pPr>
   </p:defaultTextStyle>
+  <p:extLst>
+    <p:ext uri="{EFAFB233-063F-42B5-8137-9DF3F51BA10A}">
+      <p15:sldGuideLst/>
+    </p:ext>
+  </p:extLst>
 </p:presentation>
 </file>
 
@@ -325,7 +332,7 @@
           <a:p>
             <a:fld id="{6FC38409-D950-334F-A8BE-03EBE78969AC}" type="datetimeFigureOut">
               <a:rPr lang="en-RO" smtClean="0"/>
-              <a:t>17.12.2023</a:t>
+              <a:t>18.12.2023</a:t>
             </a:fld>
             <a:endParaRPr lang="en-RO"/>
           </a:p>
@@ -660,7 +667,7 @@
           <a:p>
             <a:fld id="{6FC38409-D950-334F-A8BE-03EBE78969AC}" type="datetimeFigureOut">
               <a:rPr lang="en-RO" smtClean="0"/>
-              <a:t>17.12.2023</a:t>
+              <a:t>18.12.2023</a:t>
             </a:fld>
             <a:endParaRPr lang="en-RO"/>
           </a:p>
@@ -963,7 +970,7 @@
           <a:p>
             <a:fld id="{6FC38409-D950-334F-A8BE-03EBE78969AC}" type="datetimeFigureOut">
               <a:rPr lang="en-RO" smtClean="0"/>
-              <a:t>17.12.2023</a:t>
+              <a:t>18.12.2023</a:t>
             </a:fld>
             <a:endParaRPr lang="en-RO"/>
           </a:p>
@@ -1211,7 +1218,7 @@
           <a:p>
             <a:fld id="{6FC38409-D950-334F-A8BE-03EBE78969AC}" type="datetimeFigureOut">
               <a:rPr lang="en-RO" smtClean="0"/>
-              <a:t>17.12.2023</a:t>
+              <a:t>18.12.2023</a:t>
             </a:fld>
             <a:endParaRPr lang="en-RO"/>
           </a:p>
@@ -1619,7 +1626,7 @@
           <a:p>
             <a:fld id="{6FC38409-D950-334F-A8BE-03EBE78969AC}" type="datetimeFigureOut">
               <a:rPr lang="en-RO" smtClean="0"/>
-              <a:t>17.12.2023</a:t>
+              <a:t>18.12.2023</a:t>
             </a:fld>
             <a:endParaRPr lang="en-RO"/>
           </a:p>
@@ -1934,7 +1941,7 @@
           <a:p>
             <a:fld id="{6FC38409-D950-334F-A8BE-03EBE78969AC}" type="datetimeFigureOut">
               <a:rPr lang="en-RO" smtClean="0"/>
-              <a:t>17.12.2023</a:t>
+              <a:t>18.12.2023</a:t>
             </a:fld>
             <a:endParaRPr lang="en-RO"/>
           </a:p>
@@ -2479,7 +2486,7 @@
           <a:p>
             <a:fld id="{6FC38409-D950-334F-A8BE-03EBE78969AC}" type="datetimeFigureOut">
               <a:rPr lang="en-RO" smtClean="0"/>
-              <a:t>17.12.2023</a:t>
+              <a:t>18.12.2023</a:t>
             </a:fld>
             <a:endParaRPr lang="en-RO"/>
           </a:p>
@@ -2675,7 +2682,7 @@
           <a:p>
             <a:fld id="{6FC38409-D950-334F-A8BE-03EBE78969AC}" type="datetimeFigureOut">
               <a:rPr lang="en-RO" smtClean="0"/>
-              <a:t>17.12.2023</a:t>
+              <a:t>18.12.2023</a:t>
             </a:fld>
             <a:endParaRPr lang="en-RO"/>
           </a:p>
@@ -2889,7 +2896,7 @@
           <a:p>
             <a:fld id="{6FC38409-D950-334F-A8BE-03EBE78969AC}" type="datetimeFigureOut">
               <a:rPr lang="en-RO" smtClean="0"/>
-              <a:t>17.12.2023</a:t>
+              <a:t>18.12.2023</a:t>
             </a:fld>
             <a:endParaRPr lang="en-RO"/>
           </a:p>
@@ -3259,7 +3266,7 @@
           <a:p>
             <a:fld id="{6FC38409-D950-334F-A8BE-03EBE78969AC}" type="datetimeFigureOut">
               <a:rPr lang="en-RO" smtClean="0"/>
-              <a:t>17.12.2023</a:t>
+              <a:t>18.12.2023</a:t>
             </a:fld>
             <a:endParaRPr lang="en-RO"/>
           </a:p>
@@ -3663,7 +3670,7 @@
           <a:p>
             <a:fld id="{6FC38409-D950-334F-A8BE-03EBE78969AC}" type="datetimeFigureOut">
               <a:rPr lang="en-RO" smtClean="0"/>
-              <a:t>17.12.2023</a:t>
+              <a:t>18.12.2023</a:t>
             </a:fld>
             <a:endParaRPr lang="en-RO"/>
           </a:p>
@@ -3975,7 +3982,7 @@
           <a:p>
             <a:fld id="{6FC38409-D950-334F-A8BE-03EBE78969AC}" type="datetimeFigureOut">
               <a:rPr lang="en-RO" smtClean="0"/>
-              <a:t>17.12.2023</a:t>
+              <a:t>18.12.2023</a:t>
             </a:fld>
             <a:endParaRPr lang="en-RO"/>
           </a:p>
@@ -4475,7 +4482,7 @@
 </file>
 
 <file path=ppt/slides/slide1.xml><?xml version="1.0" encoding="utf-8"?>
-<p:sld xmlns:p="http://schemas.openxmlformats.org/presentationml/2006/main" xmlns:r="http://schemas.openxmlformats.org/officeDocument/2006/relationships" xmlns:a="http://schemas.openxmlformats.org/drawingml/2006/main" xmlns:mc="http://schemas.openxmlformats.org/markup-compatibility/2006" xmlns:c="http://schemas.openxmlformats.org/drawingml/2006/chart" xmlns:cdr="http://schemas.openxmlformats.org/drawingml/2006/chartDrawing" xmlns:c14="http://schemas.microsoft.com/office/drawing/2007/8/2/chart" xmlns:dgm="http://schemas.openxmlformats.org/drawingml/2006/diagram" xmlns:pic="http://schemas.openxmlformats.org/drawingml/2006/picture" xmlns:wp="http://schemas.openxmlformats.org/drawingml/2006/wordprocessingDrawing" xmlns:wp14="http://schemas.microsoft.com/office/word/2010/wordprocessingDrawing" xmlns:xdr="http://schemas.openxmlformats.org/drawingml/2006/spreadsheetDrawing" xmlns:dsp="http://schemas.microsoft.com/office/drawing/2008/diagram" xmlns:p14="http://schemas.microsoft.com/office/powerpoint/2010/main" xmlns:a14="http://schemas.microsoft.com/office/drawing/2010/main" xmlns:p15="http://schemas.microsoft.com/office/powerpoint/2012/main" xmlns:p166="http://schemas.microsoft.com/office/powerpoint/2016/6/main" xmlns:a13cmd="http://schemas.microsoft.com/office/drawing/2013/main/command" xmlns:p13cmd="http://schemas.microsoft.com/office/powerpoint/2013/main/command" xmlns:p1510="http://schemas.microsoft.com/office/powerpoint/2015/10/main" xmlns:psez="http://schemas.microsoft.com/office/powerpoint/2016/sectionzoom" xmlns:pslz="http://schemas.microsoft.com/office/powerpoint/2016/slidezoom" xmlns:psuz="http://schemas.microsoft.com/office/powerpoint/2016/summaryzoom" xmlns:p173="http://schemas.microsoft.com/office/powerpoint/2017/3/main" xmlns:b="http://schemas.openxmlformats.org/officeDocument/2006/bibliography" xmlns:msink="http://schemas.microsoft.com/ink/2010/main" xmlns:cdr14="http://schemas.microsoft.com/office/drawing/2010/chartDrawing" xmlns:c15="http://schemas.microsoft.com/office/drawing/2012/chart" xmlns:cs="http://schemas.microsoft.com/office/drawing/2012/chartStyle" xmlns:ns30="http://www.w3.org/1998/Math/MathML" xmlns:ns31="http://www.w3.org/2003/InkML" xmlns:cx="http://schemas.microsoft.com/office/drawing/2014/chartex" xmlns:c16="http://schemas.microsoft.com/office/drawing/2014/chart" xmlns:dgm1611="http://schemas.microsoft.com/office/drawing/2016/11/diagram" xmlns:c173="http://schemas.microsoft.com/office/drawing/2017/03/chart" xmlns:am3d="http://schemas.microsoft.com/office/drawing/2017/model3d" xmlns:an18="http://schemas.microsoft.com/office/drawing/2018/animation" xmlns:anam3d="http://schemas.microsoft.com/office/drawing/2018/animation/model3d" xmlns:iact="http://schemas.microsoft.com/office/powerpoint/2014/inkAction" xmlns:thm15="http://schemas.microsoft.com/office/thememl/2012/main" xmlns:wetp="http://schemas.microsoft.com/office/webextensions/taskpanes/2010/11" xmlns:we="http://schemas.microsoft.com/office/webextensions/webextension/2010/11" xmlns:comp="http://schemas.openxmlformats.org/drawingml/2006/compatibility" xmlns:lc="http://schemas.openxmlformats.org/drawingml/2006/lockedCanvas" xmlns:p159="http://schemas.microsoft.com/office/powerpoint/2015/09/main" xmlns:p16="http://schemas.microsoft.com/office/powerpoint/2015/main" xmlns:p1710="http://schemas.microsoft.com/office/powerpoint/2017/10/main" xmlns:p184="http://schemas.microsoft.com/office/powerpoint/2018/4/main" xmlns:dgm14="http://schemas.microsoft.com/office/drawing/2010/diagram" xmlns:a15="http://schemas.microsoft.com/office/drawing/2012/main" xmlns:pic14="http://schemas.microsoft.com/office/drawing/2010/picture" xmlns:c16ac="http://schemas.microsoft.com/office/drawing/2014/chart/ac" xmlns:a16="http://schemas.microsoft.com/office/drawing/2014/main" xmlns:a1611="http://schemas.microsoft.com/office/drawing/2016/11/main" xmlns:dgm1612="http://schemas.microsoft.com/office/drawing/2016/12/diagram" xmlns:a16svg="http://schemas.microsoft.com/office/drawing/2016/SVG/main" xmlns:adec="http://schemas.microsoft.com/office/drawing/2017/decorative" xmlns:a18hc="http://schemas.microsoft.com/office/drawing/2018/hyperlinkcolor" xmlns:v="urn:schemas-microsoft-com:vml">
+<p:sld xmlns:r="http://schemas.openxmlformats.org/officeDocument/2006/relationships" xmlns:a="http://schemas.openxmlformats.org/drawingml/2006/main" xmlns:p="http://schemas.openxmlformats.org/presentationml/2006/main" xmlns:mc="http://schemas.openxmlformats.org/markup-compatibility/2006" xmlns:c="http://schemas.openxmlformats.org/drawingml/2006/chart" xmlns:cdr="http://schemas.openxmlformats.org/drawingml/2006/chartDrawing" xmlns:c14="http://schemas.microsoft.com/office/drawing/2007/8/2/chart" xmlns:dgm="http://schemas.openxmlformats.org/drawingml/2006/diagram" xmlns:pic="http://schemas.openxmlformats.org/drawingml/2006/picture" xmlns:wp="http://schemas.openxmlformats.org/drawingml/2006/wordprocessingDrawing" xmlns:wp14="http://schemas.microsoft.com/office/word/2010/wordprocessingDrawing" xmlns:xdr="http://schemas.openxmlformats.org/drawingml/2006/spreadsheetDrawing" xmlns:dsp="http://schemas.microsoft.com/office/drawing/2008/diagram" xmlns:p14="http://schemas.microsoft.com/office/powerpoint/2010/main" xmlns:a14="http://schemas.microsoft.com/office/drawing/2010/main" xmlns:p15="http://schemas.microsoft.com/office/powerpoint/2012/main" xmlns:p166="http://schemas.microsoft.com/office/powerpoint/2016/6/main" xmlns:a13cmd="http://schemas.microsoft.com/office/drawing/2013/main/command" xmlns:p13cmd="http://schemas.microsoft.com/office/powerpoint/2013/main/command" xmlns:p1510="http://schemas.microsoft.com/office/powerpoint/2015/10/main" xmlns:psez="http://schemas.microsoft.com/office/powerpoint/2016/sectionzoom" xmlns:pslz="http://schemas.microsoft.com/office/powerpoint/2016/slidezoom" xmlns:psuz="http://schemas.microsoft.com/office/powerpoint/2016/summaryzoom" xmlns:p173="http://schemas.microsoft.com/office/powerpoint/2017/3/main" xmlns:b="http://schemas.openxmlformats.org/officeDocument/2006/bibliography" xmlns:msink="http://schemas.microsoft.com/ink/2010/main" xmlns:cdr14="http://schemas.microsoft.com/office/drawing/2010/chartDrawing" xmlns:c15="http://schemas.microsoft.com/office/drawing/2012/chart" xmlns:cs="http://schemas.microsoft.com/office/drawing/2012/chartStyle" xmlns:ns30="http://www.w3.org/1998/Math/MathML" xmlns:ns31="http://www.w3.org/2003/InkML" xmlns:cx="http://schemas.microsoft.com/office/drawing/2014/chartex" xmlns:c16="http://schemas.microsoft.com/office/drawing/2014/chart" xmlns:dgm1611="http://schemas.microsoft.com/office/drawing/2016/11/diagram" xmlns:c173="http://schemas.microsoft.com/office/drawing/2017/03/chart" xmlns:am3d="http://schemas.microsoft.com/office/drawing/2017/model3d" xmlns:an18="http://schemas.microsoft.com/office/drawing/2018/animation" xmlns:anam3d="http://schemas.microsoft.com/office/drawing/2018/animation/model3d" xmlns:iact="http://schemas.microsoft.com/office/powerpoint/2014/inkAction" xmlns:thm15="http://schemas.microsoft.com/office/thememl/2012/main" xmlns:wetp="http://schemas.microsoft.com/office/webextensions/taskpanes/2010/11" xmlns:we="http://schemas.microsoft.com/office/webextensions/webextension/2010/11" xmlns:comp="http://schemas.openxmlformats.org/drawingml/2006/compatibility" xmlns:lc="http://schemas.openxmlformats.org/drawingml/2006/lockedCanvas" xmlns:p159="http://schemas.microsoft.com/office/powerpoint/2015/09/main" xmlns:p16="http://schemas.microsoft.com/office/powerpoint/2015/main" xmlns:p1710="http://schemas.microsoft.com/office/powerpoint/2017/10/main" xmlns:p184="http://schemas.microsoft.com/office/powerpoint/2018/4/main" xmlns:dgm14="http://schemas.microsoft.com/office/drawing/2010/diagram" xmlns:a15="http://schemas.microsoft.com/office/drawing/2012/main" xmlns:pic14="http://schemas.microsoft.com/office/drawing/2010/picture" xmlns:c16ac="http://schemas.microsoft.com/office/drawing/2014/chart/ac" xmlns:a16="http://schemas.microsoft.com/office/drawing/2014/main" xmlns:a1611="http://schemas.microsoft.com/office/drawing/2016/11/main" xmlns:dgm1612="http://schemas.microsoft.com/office/drawing/2016/12/diagram" xmlns:a16svg="http://schemas.microsoft.com/office/drawing/2016/SVG/main" xmlns:adec="http://schemas.microsoft.com/office/drawing/2017/decorative" xmlns:a18hc="http://schemas.microsoft.com/office/drawing/2018/hyperlinkcolor" xmlns:v="urn:schemas-microsoft-com:vml">
   <p:cSld>
     <p:spTree>
       <p:nvGrpSpPr>
@@ -4561,7 +4568,7 @@
 </file>
 
 <file path=ppt/slides/slide2.xml><?xml version="1.0" encoding="utf-8"?>
-<p:sld xmlns:p="http://schemas.openxmlformats.org/presentationml/2006/main" xmlns:r="http://schemas.openxmlformats.org/officeDocument/2006/relationships" xmlns:a="http://schemas.openxmlformats.org/drawingml/2006/main" xmlns:mc="http://schemas.openxmlformats.org/markup-compatibility/2006" xmlns:c="http://schemas.openxmlformats.org/drawingml/2006/chart" xmlns:cdr="http://schemas.openxmlformats.org/drawingml/2006/chartDrawing" xmlns:c14="http://schemas.microsoft.com/office/drawing/2007/8/2/chart" xmlns:dgm="http://schemas.openxmlformats.org/drawingml/2006/diagram" xmlns:pic="http://schemas.openxmlformats.org/drawingml/2006/picture" xmlns:wp="http://schemas.openxmlformats.org/drawingml/2006/wordprocessingDrawing" xmlns:wp14="http://schemas.microsoft.com/office/word/2010/wordprocessingDrawing" xmlns:xdr="http://schemas.openxmlformats.org/drawingml/2006/spreadsheetDrawing" xmlns:dsp="http://schemas.microsoft.com/office/drawing/2008/diagram" xmlns:p14="http://schemas.microsoft.com/office/powerpoint/2010/main" xmlns:a14="http://schemas.microsoft.com/office/drawing/2010/main" xmlns:p15="http://schemas.microsoft.com/office/powerpoint/2012/main" xmlns:p166="http://schemas.microsoft.com/office/powerpoint/2016/6/main" xmlns:a13cmd="http://schemas.microsoft.com/office/drawing/2013/main/command" xmlns:p13cmd="http://schemas.microsoft.com/office/powerpoint/2013/main/command" xmlns:p1510="http://schemas.microsoft.com/office/powerpoint/2015/10/main" xmlns:psez="http://schemas.microsoft.com/office/powerpoint/2016/sectionzoom" xmlns:pslz="http://schemas.microsoft.com/office/powerpoint/2016/slidezoom" xmlns:psuz="http://schemas.microsoft.com/office/powerpoint/2016/summaryzoom" xmlns:p173="http://schemas.microsoft.com/office/powerpoint/2017/3/main" xmlns:b="http://schemas.openxmlformats.org/officeDocument/2006/bibliography" xmlns:msink="http://schemas.microsoft.com/ink/2010/main" xmlns:cdr14="http://schemas.microsoft.com/office/drawing/2010/chartDrawing" xmlns:c15="http://schemas.microsoft.com/office/drawing/2012/chart" xmlns:cs="http://schemas.microsoft.com/office/drawing/2012/chartStyle" xmlns:ns30="http://www.w3.org/1998/Math/MathML" xmlns:ns31="http://www.w3.org/2003/InkML" xmlns:cx="http://schemas.microsoft.com/office/drawing/2014/chartex" xmlns:c16="http://schemas.microsoft.com/office/drawing/2014/chart" xmlns:dgm1611="http://schemas.microsoft.com/office/drawing/2016/11/diagram" xmlns:c173="http://schemas.microsoft.com/office/drawing/2017/03/chart" xmlns:am3d="http://schemas.microsoft.com/office/drawing/2017/model3d" xmlns:an18="http://schemas.microsoft.com/office/drawing/2018/animation" xmlns:anam3d="http://schemas.microsoft.com/office/drawing/2018/animation/model3d" xmlns:iact="http://schemas.microsoft.com/office/powerpoint/2014/inkAction" xmlns:thm15="http://schemas.microsoft.com/office/thememl/2012/main" xmlns:wetp="http://schemas.microsoft.com/office/webextensions/taskpanes/2010/11" xmlns:we="http://schemas.microsoft.com/office/webextensions/webextension/2010/11" xmlns:comp="http://schemas.openxmlformats.org/drawingml/2006/compatibility" xmlns:lc="http://schemas.openxmlformats.org/drawingml/2006/lockedCanvas" xmlns:p159="http://schemas.microsoft.com/office/powerpoint/2015/09/main" xmlns:p16="http://schemas.microsoft.com/office/powerpoint/2015/main" xmlns:p1710="http://schemas.microsoft.com/office/powerpoint/2017/10/main" xmlns:p184="http://schemas.microsoft.com/office/powerpoint/2018/4/main" xmlns:dgm14="http://schemas.microsoft.com/office/drawing/2010/diagram" xmlns:a15="http://schemas.microsoft.com/office/drawing/2012/main" xmlns:pic14="http://schemas.microsoft.com/office/drawing/2010/picture" xmlns:c16ac="http://schemas.microsoft.com/office/drawing/2014/chart/ac" xmlns:a16="http://schemas.microsoft.com/office/drawing/2014/main" xmlns:a1611="http://schemas.microsoft.com/office/drawing/2016/11/main" xmlns:dgm1612="http://schemas.microsoft.com/office/drawing/2016/12/diagram" xmlns:a16svg="http://schemas.microsoft.com/office/drawing/2016/SVG/main" xmlns:adec="http://schemas.microsoft.com/office/drawing/2017/decorative" xmlns:a18hc="http://schemas.microsoft.com/office/drawing/2018/hyperlinkcolor" xmlns:v="urn:schemas-microsoft-com:vml">
+<p:sld xmlns:r="http://schemas.openxmlformats.org/officeDocument/2006/relationships" xmlns:a="http://schemas.openxmlformats.org/drawingml/2006/main" xmlns:p="http://schemas.openxmlformats.org/presentationml/2006/main" xmlns:mc="http://schemas.openxmlformats.org/markup-compatibility/2006" xmlns:c="http://schemas.openxmlformats.org/drawingml/2006/chart" xmlns:cdr="http://schemas.openxmlformats.org/drawingml/2006/chartDrawing" xmlns:c14="http://schemas.microsoft.com/office/drawing/2007/8/2/chart" xmlns:dgm="http://schemas.openxmlformats.org/drawingml/2006/diagram" xmlns:pic="http://schemas.openxmlformats.org/drawingml/2006/picture" xmlns:wp="http://schemas.openxmlformats.org/drawingml/2006/wordprocessingDrawing" xmlns:wp14="http://schemas.microsoft.com/office/word/2010/wordprocessingDrawing" xmlns:xdr="http://schemas.openxmlformats.org/drawingml/2006/spreadsheetDrawing" xmlns:dsp="http://schemas.microsoft.com/office/drawing/2008/diagram" xmlns:p14="http://schemas.microsoft.com/office/powerpoint/2010/main" xmlns:a14="http://schemas.microsoft.com/office/drawing/2010/main" xmlns:p15="http://schemas.microsoft.com/office/powerpoint/2012/main" xmlns:p166="http://schemas.microsoft.com/office/powerpoint/2016/6/main" xmlns:a13cmd="http://schemas.microsoft.com/office/drawing/2013/main/command" xmlns:p13cmd="http://schemas.microsoft.com/office/powerpoint/2013/main/command" xmlns:p1510="http://schemas.microsoft.com/office/powerpoint/2015/10/main" xmlns:psez="http://schemas.microsoft.com/office/powerpoint/2016/sectionzoom" xmlns:pslz="http://schemas.microsoft.com/office/powerpoint/2016/slidezoom" xmlns:psuz="http://schemas.microsoft.com/office/powerpoint/2016/summaryzoom" xmlns:p173="http://schemas.microsoft.com/office/powerpoint/2017/3/main" xmlns:b="http://schemas.openxmlformats.org/officeDocument/2006/bibliography" xmlns:msink="http://schemas.microsoft.com/ink/2010/main" xmlns:cdr14="http://schemas.microsoft.com/office/drawing/2010/chartDrawing" xmlns:c15="http://schemas.microsoft.com/office/drawing/2012/chart" xmlns:cs="http://schemas.microsoft.com/office/drawing/2012/chartStyle" xmlns:ns30="http://www.w3.org/1998/Math/MathML" xmlns:ns31="http://www.w3.org/2003/InkML" xmlns:cx="http://schemas.microsoft.com/office/drawing/2014/chartex" xmlns:c16="http://schemas.microsoft.com/office/drawing/2014/chart" xmlns:dgm1611="http://schemas.microsoft.com/office/drawing/2016/11/diagram" xmlns:c173="http://schemas.microsoft.com/office/drawing/2017/03/chart" xmlns:am3d="http://schemas.microsoft.com/office/drawing/2017/model3d" xmlns:an18="http://schemas.microsoft.com/office/drawing/2018/animation" xmlns:anam3d="http://schemas.microsoft.com/office/drawing/2018/animation/model3d" xmlns:iact="http://schemas.microsoft.com/office/powerpoint/2014/inkAction" xmlns:thm15="http://schemas.microsoft.com/office/thememl/2012/main" xmlns:wetp="http://schemas.microsoft.com/office/webextensions/taskpanes/2010/11" xmlns:we="http://schemas.microsoft.com/office/webextensions/webextension/2010/11" xmlns:comp="http://schemas.openxmlformats.org/drawingml/2006/compatibility" xmlns:lc="http://schemas.openxmlformats.org/drawingml/2006/lockedCanvas" xmlns:p159="http://schemas.microsoft.com/office/powerpoint/2015/09/main" xmlns:p16="http://schemas.microsoft.com/office/powerpoint/2015/main" xmlns:p1710="http://schemas.microsoft.com/office/powerpoint/2017/10/main" xmlns:p184="http://schemas.microsoft.com/office/powerpoint/2018/4/main" xmlns:dgm14="http://schemas.microsoft.com/office/drawing/2010/diagram" xmlns:a15="http://schemas.microsoft.com/office/drawing/2012/main" xmlns:pic14="http://schemas.microsoft.com/office/drawing/2010/picture" xmlns:c16ac="http://schemas.microsoft.com/office/drawing/2014/chart/ac" xmlns:a16="http://schemas.microsoft.com/office/drawing/2014/main" xmlns:a1611="http://schemas.microsoft.com/office/drawing/2016/11/main" xmlns:dgm1612="http://schemas.microsoft.com/office/drawing/2016/12/diagram" xmlns:a16svg="http://schemas.microsoft.com/office/drawing/2016/SVG/main" xmlns:adec="http://schemas.microsoft.com/office/drawing/2017/decorative" xmlns:a18hc="http://schemas.microsoft.com/office/drawing/2018/hyperlinkcolor" xmlns:v="urn:schemas-microsoft-com:vml">
   <p:cSld>
     <p:bg>
       <p:bgPr>
@@ -4729,6 +4736,13 @@
             <a:schemeClr val="lt1"/>
           </a:fontRef>
         </p:style>
+        <p:txBody>
+          <a:bodyPr/>
+          <a:lstStyle/>
+          <a:p>
+            <a:endParaRPr lang="en-RO"/>
+          </a:p>
+        </p:txBody>
       </p:sp>
       <p:sp>
         <p:nvSpPr>
@@ -4784,6 +4798,13 @@
             <a:schemeClr val="lt1"/>
           </a:fontRef>
         </p:style>
+        <p:txBody>
+          <a:bodyPr/>
+          <a:lstStyle/>
+          <a:p>
+            <a:endParaRPr lang="en-RO"/>
+          </a:p>
+        </p:txBody>
       </p:sp>
       <p:sp>
         <p:nvSpPr>
@@ -4841,6 +4862,13 @@
             <a:schemeClr val="lt1"/>
           </a:fontRef>
         </p:style>
+        <p:txBody>
+          <a:bodyPr/>
+          <a:lstStyle/>
+          <a:p>
+            <a:endParaRPr lang="en-RO"/>
+          </a:p>
+        </p:txBody>
       </p:sp>
       <p:sp>
         <p:nvSpPr>
@@ -4896,6 +4924,13 @@
             <a:schemeClr val="lt1"/>
           </a:fontRef>
         </p:style>
+        <p:txBody>
+          <a:bodyPr/>
+          <a:lstStyle/>
+          <a:p>
+            <a:endParaRPr lang="en-RO"/>
+          </a:p>
+        </p:txBody>
       </p:sp>
       <p:sp>
         <p:nvSpPr>
@@ -5170,12 +5205,12 @@
           <a:p>
             <a:pPr algn="l"/>
             <a:r>
-              <a:rPr lang="en-US" sz="6600">
+              <a:rPr lang="en-US" sz="6600" dirty="false">
                 <a:solidFill>
                   <a:srgbClr val="1F2D29"/>
                 </a:solidFill>
               </a:rPr>
-              <a:t>Last message</a:t>
+              <a:t>second</a:t>
             </a:r>
           </a:p>
         </p:txBody>
@@ -5234,6 +5269,13 @@
             <a:schemeClr val="lt1"/>
           </a:fontRef>
         </p:style>
+        <p:txBody>
+          <a:bodyPr/>
+          <a:lstStyle/>
+          <a:p>
+            <a:endParaRPr lang="en-RO"/>
+          </a:p>
+        </p:txBody>
       </p:sp>
       <p:sp>
         <p:nvSpPr>
@@ -5302,6 +5344,1749 @@
     <p:extLst>
       <p:ext uri="{BB962C8B-B14F-4D97-AF65-F5344CB8AC3E}">
         <p14:creationId val="3495121098"/>
+      </p:ext>
+    </p:extLst>
+  </p:cSld>
+  <p:clrMapOvr>
+    <a:overrideClrMapping bg1="lt1" tx1="dk1" bg2="lt2" tx2="dk2" accent1="accent1" accent2="accent2" accent3="accent3" accent4="accent4" accent5="accent5" accent6="accent6" hlink="hlink" folHlink="folHlink"/>
+  </p:clrMapOvr>
+</p:sld>
+</file>
+
+<file path=ppt/slides/slide3.xml><?xml version="1.0" encoding="utf-8"?>
+<p:sld xmlns:r="http://schemas.openxmlformats.org/officeDocument/2006/relationships" xmlns:a="http://schemas.openxmlformats.org/drawingml/2006/main" xmlns:p="http://schemas.openxmlformats.org/presentationml/2006/main" xmlns:mc="http://schemas.openxmlformats.org/markup-compatibility/2006" xmlns:c="http://schemas.openxmlformats.org/drawingml/2006/chart" xmlns:cdr="http://schemas.openxmlformats.org/drawingml/2006/chartDrawing" xmlns:c14="http://schemas.microsoft.com/office/drawing/2007/8/2/chart" xmlns:dgm="http://schemas.openxmlformats.org/drawingml/2006/diagram" xmlns:pic="http://schemas.openxmlformats.org/drawingml/2006/picture" xmlns:wp="http://schemas.openxmlformats.org/drawingml/2006/wordprocessingDrawing" xmlns:wp14="http://schemas.microsoft.com/office/word/2010/wordprocessingDrawing" xmlns:xdr="http://schemas.openxmlformats.org/drawingml/2006/spreadsheetDrawing" xmlns:dsp="http://schemas.microsoft.com/office/drawing/2008/diagram" xmlns:p14="http://schemas.microsoft.com/office/powerpoint/2010/main" xmlns:a14="http://schemas.microsoft.com/office/drawing/2010/main" xmlns:p15="http://schemas.microsoft.com/office/powerpoint/2012/main" xmlns:p166="http://schemas.microsoft.com/office/powerpoint/2016/6/main" xmlns:a13cmd="http://schemas.microsoft.com/office/drawing/2013/main/command" xmlns:p13cmd="http://schemas.microsoft.com/office/powerpoint/2013/main/command" xmlns:p1510="http://schemas.microsoft.com/office/powerpoint/2015/10/main" xmlns:psez="http://schemas.microsoft.com/office/powerpoint/2016/sectionzoom" xmlns:pslz="http://schemas.microsoft.com/office/powerpoint/2016/slidezoom" xmlns:psuz="http://schemas.microsoft.com/office/powerpoint/2016/summaryzoom" xmlns:p173="http://schemas.microsoft.com/office/powerpoint/2017/3/main" xmlns:b="http://schemas.openxmlformats.org/officeDocument/2006/bibliography" xmlns:msink="http://schemas.microsoft.com/ink/2010/main" xmlns:cdr14="http://schemas.microsoft.com/office/drawing/2010/chartDrawing" xmlns:c15="http://schemas.microsoft.com/office/drawing/2012/chart" xmlns:cs="http://schemas.microsoft.com/office/drawing/2012/chartStyle" xmlns:ns30="http://www.w3.org/1998/Math/MathML" xmlns:ns31="http://www.w3.org/2003/InkML" xmlns:cx="http://schemas.microsoft.com/office/drawing/2014/chartex" xmlns:c16="http://schemas.microsoft.com/office/drawing/2014/chart" xmlns:dgm1611="http://schemas.microsoft.com/office/drawing/2016/11/diagram" xmlns:c173="http://schemas.microsoft.com/office/drawing/2017/03/chart" xmlns:am3d="http://schemas.microsoft.com/office/drawing/2017/model3d" xmlns:an18="http://schemas.microsoft.com/office/drawing/2018/animation" xmlns:anam3d="http://schemas.microsoft.com/office/drawing/2018/animation/model3d" xmlns:iact="http://schemas.microsoft.com/office/powerpoint/2014/inkAction" xmlns:thm15="http://schemas.microsoft.com/office/thememl/2012/main" xmlns:wetp="http://schemas.microsoft.com/office/webextensions/taskpanes/2010/11" xmlns:we="http://schemas.microsoft.com/office/webextensions/webextension/2010/11" xmlns:comp="http://schemas.openxmlformats.org/drawingml/2006/compatibility" xmlns:lc="http://schemas.openxmlformats.org/drawingml/2006/lockedCanvas" xmlns:p159="http://schemas.microsoft.com/office/powerpoint/2015/09/main" xmlns:p16="http://schemas.microsoft.com/office/powerpoint/2015/main" xmlns:p1710="http://schemas.microsoft.com/office/powerpoint/2017/10/main" xmlns:p184="http://schemas.microsoft.com/office/powerpoint/2018/4/main" xmlns:dgm14="http://schemas.microsoft.com/office/drawing/2010/diagram" xmlns:a15="http://schemas.microsoft.com/office/drawing/2012/main" xmlns:pic14="http://schemas.microsoft.com/office/drawing/2010/picture" xmlns:c16ac="http://schemas.microsoft.com/office/drawing/2014/chart/ac" xmlns:a16="http://schemas.microsoft.com/office/drawing/2014/main" xmlns:a1611="http://schemas.microsoft.com/office/drawing/2016/11/main" xmlns:dgm1612="http://schemas.microsoft.com/office/drawing/2016/12/diagram" xmlns:a16svg="http://schemas.microsoft.com/office/drawing/2016/SVG/main" xmlns:adec="http://schemas.microsoft.com/office/drawing/2017/decorative" xmlns:a18hc="http://schemas.microsoft.com/office/drawing/2018/hyperlinkcolor" xmlns:v="urn:schemas-microsoft-com:vml">
+  <p:cSld>
+    <p:bg>
+      <p:bgPr>
+        <a:solidFill>
+          <a:schemeClr val="bg1"/>
+        </a:solidFill>
+        <a:effectLst/>
+      </p:bgPr>
+    </p:bg>
+    <p:spTree>
+      <p:nvGrpSpPr>
+        <p:cNvPr id="1" name=""/>
+        <p:cNvGrpSpPr/>
+        <p:nvPr/>
+      </p:nvGrpSpPr>
+      <p:grpSpPr>
+        <a:xfrm>
+          <a:off x="0" y="0"/>
+          <a:ext cx="0" cy="0"/>
+          <a:chOff x="0" y="0"/>
+          <a:chExt cx="0" cy="0"/>
+        </a:xfrm>
+      </p:grpSpPr>
+      <p:pic>
+        <p:nvPicPr>
+          <p:cNvPr id="8" name="Picture 7">
+            <a:extLst>
+              <a:ext uri="{FF2B5EF4-FFF2-40B4-BE49-F238E27FC236}">
+                <a16:creationId id="{3DBBA26C-89C3-411F-9753-606A413F89AF}"/>
+              </a:ext>
+              <a:ext uri="{C183D7F6-B498-43B3-948B-1728B52AA6E4}">
+                <adec:decorative val="true"/>
+              </a:ext>
+            </a:extLst>
+          </p:cNvPr>
+          <p:cNvPicPr>
+            <a:picLocks noCrop="true" noGrp="true" noRot="true" noChangeAspect="true" noMove="true" noResize="true" noEditPoints="true" noAdjustHandles="true" noChangeArrowheads="true" noChangeShapeType="true"/>
+          </p:cNvPicPr>
+          <p:nvPr>
+            <p:extLst>
+              <p:ext uri="{386F3935-93C4-4BCD-93E2-E3B085C9AB24}">
+                <p16:designElem val="true"/>
+              </p:ext>
+            </p:extLst>
+          </p:nvPr>
+        </p:nvPicPr>
+        <p:blipFill>
+          <a:blip r:embed="rId2">
+            <a:extLst>
+              <a:ext uri="{28A0092B-C50C-407E-A947-70E740481C1C}">
+                <a14:useLocalDpi val="false"/>
+              </a:ext>
+            </a:extLst>
+          </a:blip>
+          <a:stretch>
+            <a:fillRect/>
+          </a:stretch>
+        </p:blipFill>
+        <p:spPr>
+          <a:xfrm>
+            <a:off x="2831794" y="2105202"/>
+            <a:ext cx="9360205" cy="4752798"/>
+          </a:xfrm>
+          <a:prstGeom prst="rect">
+            <a:avLst/>
+          </a:prstGeom>
+        </p:spPr>
+      </p:pic>
+      <p:pic>
+        <p:nvPicPr>
+          <p:cNvPr id="10" name="Picture 9">
+            <a:extLst>
+              <a:ext uri="{FF2B5EF4-FFF2-40B4-BE49-F238E27FC236}">
+                <a16:creationId id="{EEAD2215-6311-4D1C-B6B5-F57CB6BFCBCA}"/>
+              </a:ext>
+              <a:ext uri="{C183D7F6-B498-43B3-948B-1728B52AA6E4}">
+                <adec:decorative val="true"/>
+              </a:ext>
+            </a:extLst>
+          </p:cNvPr>
+          <p:cNvPicPr>
+            <a:picLocks noCrop="true" noGrp="true" noRot="true" noChangeAspect="true" noMove="true" noResize="true" noEditPoints="true" noAdjustHandles="true" noChangeArrowheads="true" noChangeShapeType="true"/>
+          </p:cNvPicPr>
+          <p:nvPr>
+            <p:extLst>
+              <p:ext uri="{386F3935-93C4-4BCD-93E2-E3B085C9AB24}">
+                <p16:designElem val="true"/>
+              </p:ext>
+            </p:extLst>
+          </p:nvPr>
+        </p:nvPicPr>
+        <p:blipFill>
+          <a:blip r:embed="rId3">
+            <a:extLst>
+              <a:ext uri="{28A0092B-C50C-407E-A947-70E740481C1C}">
+                <a14:useLocalDpi val="false"/>
+              </a:ext>
+            </a:extLst>
+          </a:blip>
+          <a:stretch>
+            <a:fillRect/>
+          </a:stretch>
+        </p:blipFill>
+        <p:spPr>
+          <a:xfrm>
+            <a:off x="0" y="0"/>
+            <a:ext cx="12189867" cy="6858000"/>
+          </a:xfrm>
+          <a:prstGeom prst="rect">
+            <a:avLst/>
+          </a:prstGeom>
+        </p:spPr>
+      </p:pic>
+      <p:sp>
+        <p:nvSpPr>
+          <p:cNvPr id="12" name="Rectangle 11">
+            <a:extLst>
+              <a:ext uri="{FF2B5EF4-FFF2-40B4-BE49-F238E27FC236}">
+                <a16:creationId id="{7BA5DE79-30D1-4A10-8DB9-0A6E523A9723}"/>
+              </a:ext>
+              <a:ext uri="{C183D7F6-B498-43B3-948B-1728B52AA6E4}">
+                <adec:decorative val="true"/>
+              </a:ext>
+            </a:extLst>
+          </p:cNvPr>
+          <p:cNvSpPr>
+            <a:spLocks noTextEdit="true" noGrp="true" noRot="true" noChangeAspect="true" noMove="true" noResize="true" noEditPoints="true" noAdjustHandles="true" noChangeArrowheads="true" noChangeShapeType="true"/>
+          </p:cNvSpPr>
+          <p:nvPr>
+            <p:extLst>
+              <p:ext uri="{386F3935-93C4-4BCD-93E2-E3B085C9AB24}">
+                <p16:designElem val="true"/>
+              </p:ext>
+            </p:extLst>
+          </p:nvPr>
+        </p:nvSpPr>
+        <p:spPr>
+          <a:xfrm>
+            <a:off x="0" y="0"/>
+            <a:ext cx="964174" cy="6858000"/>
+          </a:xfrm>
+          <a:prstGeom prst="rect">
+            <a:avLst/>
+          </a:prstGeom>
+          <a:solidFill>
+            <a:schemeClr val="bg2"/>
+          </a:solidFill>
+          <a:ln>
+            <a:noFill/>
+          </a:ln>
+        </p:spPr>
+        <p:style>
+          <a:lnRef idx="2">
+            <a:schemeClr val="accent1">
+              <a:shade val="50000"/>
+            </a:schemeClr>
+          </a:lnRef>
+          <a:fillRef idx="1">
+            <a:schemeClr val="accent1"/>
+          </a:fillRef>
+          <a:effectRef idx="0">
+            <a:schemeClr val="accent1"/>
+          </a:effectRef>
+          <a:fontRef idx="minor">
+            <a:schemeClr val="lt1"/>
+          </a:fontRef>
+        </p:style>
+        <p:txBody>
+          <a:bodyPr/>
+          <a:lstStyle/>
+          <a:p>
+            <a:endParaRPr lang="en-RO"/>
+          </a:p>
+        </p:txBody>
+      </p:sp>
+      <p:sp>
+        <p:nvSpPr>
+          <p:cNvPr id="14" name="Rectangle 13">
+            <a:extLst>
+              <a:ext uri="{FF2B5EF4-FFF2-40B4-BE49-F238E27FC236}">
+                <a16:creationId id="{9ABD0D63-D23F-4AE7-8270-4185EF9C1C25}"/>
+              </a:ext>
+              <a:ext uri="{C183D7F6-B498-43B3-948B-1728B52AA6E4}">
+                <adec:decorative val="true"/>
+              </a:ext>
+            </a:extLst>
+          </p:cNvPr>
+          <p:cNvSpPr>
+            <a:spLocks noTextEdit="true" noGrp="true" noRot="true" noChangeAspect="true" noMove="true" noResize="true" noEditPoints="true" noAdjustHandles="true" noChangeArrowheads="true" noChangeShapeType="true"/>
+          </p:cNvSpPr>
+          <p:nvPr>
+            <p:extLst>
+              <p:ext uri="{386F3935-93C4-4BCD-93E2-E3B085C9AB24}">
+                <p16:designElem val="true"/>
+              </p:ext>
+            </p:extLst>
+          </p:nvPr>
+        </p:nvSpPr>
+        <p:spPr>
+          <a:xfrm>
+            <a:off x="962042" y="0"/>
+            <a:ext cx="45719" cy="6858000"/>
+          </a:xfrm>
+          <a:prstGeom prst="rect">
+            <a:avLst/>
+          </a:prstGeom>
+          <a:solidFill>
+            <a:schemeClr val="accent6"/>
+          </a:solidFill>
+          <a:ln>
+            <a:noFill/>
+          </a:ln>
+        </p:spPr>
+        <p:style>
+          <a:lnRef idx="2">
+            <a:schemeClr val="accent1">
+              <a:shade val="50000"/>
+            </a:schemeClr>
+          </a:lnRef>
+          <a:fillRef idx="1">
+            <a:schemeClr val="accent1"/>
+          </a:fillRef>
+          <a:effectRef idx="0">
+            <a:schemeClr val="accent1"/>
+          </a:effectRef>
+          <a:fontRef idx="minor">
+            <a:schemeClr val="lt1"/>
+          </a:fontRef>
+        </p:style>
+        <p:txBody>
+          <a:bodyPr/>
+          <a:lstStyle/>
+          <a:p>
+            <a:endParaRPr lang="en-RO"/>
+          </a:p>
+        </p:txBody>
+      </p:sp>
+      <p:sp>
+        <p:nvSpPr>
+          <p:cNvPr id="16" name="Rectangle 15">
+            <a:extLst>
+              <a:ext uri="{FF2B5EF4-FFF2-40B4-BE49-F238E27FC236}">
+                <a16:creationId id="{72168E9E-94E9-4BE3-B88C-C8A468117753}"/>
+              </a:ext>
+              <a:ext uri="{C183D7F6-B498-43B3-948B-1728B52AA6E4}">
+                <adec:decorative val="true"/>
+              </a:ext>
+            </a:extLst>
+          </p:cNvPr>
+          <p:cNvSpPr>
+            <a:spLocks noTextEdit="true" noGrp="true" noRot="true" noChangeAspect="true" noMove="true" noResize="true" noEditPoints="true" noAdjustHandles="true" noChangeArrowheads="true" noChangeShapeType="true"/>
+          </p:cNvSpPr>
+          <p:nvPr>
+            <p:extLst>
+              <p:ext uri="{386F3935-93C4-4BCD-93E2-E3B085C9AB24}">
+                <p16:designElem val="true"/>
+              </p:ext>
+            </p:extLst>
+          </p:nvPr>
+        </p:nvSpPr>
+        <p:spPr>
+          <a:xfrm>
+            <a:off x="1007533" y="0"/>
+            <a:ext cx="7934348" cy="6858000"/>
+          </a:xfrm>
+          <a:prstGeom prst="rect">
+            <a:avLst/>
+          </a:prstGeom>
+          <a:solidFill>
+            <a:schemeClr val="bg2">
+              <a:alpha val="92000"/>
+            </a:schemeClr>
+          </a:solidFill>
+          <a:ln>
+            <a:noFill/>
+          </a:ln>
+        </p:spPr>
+        <p:style>
+          <a:lnRef idx="2">
+            <a:schemeClr val="accent1">
+              <a:shade val="50000"/>
+            </a:schemeClr>
+          </a:lnRef>
+          <a:fillRef idx="1">
+            <a:schemeClr val="accent1"/>
+          </a:fillRef>
+          <a:effectRef idx="0">
+            <a:schemeClr val="accent1"/>
+          </a:effectRef>
+          <a:fontRef idx="minor">
+            <a:schemeClr val="lt1"/>
+          </a:fontRef>
+        </p:style>
+        <p:txBody>
+          <a:bodyPr/>
+          <a:lstStyle/>
+          <a:p>
+            <a:endParaRPr lang="en-RO"/>
+          </a:p>
+        </p:txBody>
+      </p:sp>
+      <p:sp>
+        <p:nvSpPr>
+          <p:cNvPr id="18" name="Rectangle 17">
+            <a:extLst>
+              <a:ext uri="{FF2B5EF4-FFF2-40B4-BE49-F238E27FC236}">
+                <a16:creationId id="{12107AC1-AA0D-4097-B03D-FD3C632AB886}"/>
+              </a:ext>
+              <a:ext uri="{C183D7F6-B498-43B3-948B-1728B52AA6E4}">
+                <adec:decorative val="true"/>
+              </a:ext>
+            </a:extLst>
+          </p:cNvPr>
+          <p:cNvSpPr>
+            <a:spLocks noTextEdit="true" noGrp="true" noRot="true" noChangeAspect="true" noMove="true" noResize="true" noEditPoints="true" noAdjustHandles="true" noChangeArrowheads="true" noChangeShapeType="true"/>
+          </p:cNvSpPr>
+          <p:nvPr>
+            <p:extLst>
+              <p:ext uri="{386F3935-93C4-4BCD-93E2-E3B085C9AB24}">
+                <p16:designElem val="true"/>
+              </p:ext>
+            </p:extLst>
+          </p:nvPr>
+        </p:nvSpPr>
+        <p:spPr>
+          <a:xfrm>
+            <a:off x="8941881" y="0"/>
+            <a:ext cx="27432" cy="6858000"/>
+          </a:xfrm>
+          <a:prstGeom prst="rect">
+            <a:avLst/>
+          </a:prstGeom>
+          <a:solidFill>
+            <a:schemeClr val="accent6"/>
+          </a:solidFill>
+          <a:ln>
+            <a:noFill/>
+          </a:ln>
+        </p:spPr>
+        <p:style>
+          <a:lnRef idx="2">
+            <a:schemeClr val="accent1">
+              <a:shade val="50000"/>
+            </a:schemeClr>
+          </a:lnRef>
+          <a:fillRef idx="1">
+            <a:schemeClr val="accent1"/>
+          </a:fillRef>
+          <a:effectRef idx="0">
+            <a:schemeClr val="accent1"/>
+          </a:effectRef>
+          <a:fontRef idx="minor">
+            <a:schemeClr val="lt1"/>
+          </a:fontRef>
+        </p:style>
+        <p:txBody>
+          <a:bodyPr/>
+          <a:lstStyle/>
+          <a:p>
+            <a:endParaRPr lang="en-RO"/>
+          </a:p>
+        </p:txBody>
+      </p:sp>
+      <p:sp>
+        <p:nvSpPr>
+          <p:cNvPr id="20" name="TextBox 19">
+            <a:extLst>
+              <a:ext uri="{FF2B5EF4-FFF2-40B4-BE49-F238E27FC236}">
+                <a16:creationId id="{7C8D231A-EC46-4736-B00F-76D307082204}"/>
+              </a:ext>
+              <a:ext uri="{C183D7F6-B498-43B3-948B-1728B52AA6E4}">
+                <adec:decorative val="true"/>
+              </a:ext>
+            </a:extLst>
+          </p:cNvPr>
+          <p:cNvSpPr txBox="true">
+            <a:spLocks noTextEdit="true" noGrp="true" noRot="true" noChangeAspect="true" noMove="true" noResize="true" noEditPoints="true" noAdjustHandles="true" noChangeArrowheads="true" noChangeShapeType="true"/>
+          </p:cNvSpPr>
+          <p:nvPr>
+            <p:extLst>
+              <p:ext uri="{386F3935-93C4-4BCD-93E2-E3B085C9AB24}">
+                <p16:designElem val="true"/>
+              </p:ext>
+            </p:extLst>
+          </p:nvPr>
+        </p:nvSpPr>
+        <p:spPr>
+          <a:xfrm>
+            <a:off x="2191282" y="3262852"/>
+            <a:ext cx="415636" cy="461665"/>
+          </a:xfrm>
+          <a:prstGeom prst="rect">
+            <a:avLst/>
+          </a:prstGeom>
+          <a:noFill/>
+        </p:spPr>
+        <p:txBody>
+          <a:bodyPr wrap="square" rtlCol="false">
+            <a:spAutoFit/>
+          </a:bodyPr>
+          <a:lstStyle/>
+          <a:p>
+            <a:pPr algn="r">
+              <a:spcAft>
+                <a:spcPts val="600"/>
+              </a:spcAft>
+            </a:pPr>
+            <a:r>
+              <a:rPr lang="en-US" sz="2400" dirty="false">
+                <a:solidFill>
+                  <a:schemeClr val="accent6"/>
+                </a:solidFill>
+                <a:latin typeface="Wingdings 3" panose="05040102010807070707" pitchFamily="18" charset="2"/>
+              </a:rPr>
+              <a:t>z</a:t>
+            </a:r>
+            <a:endParaRPr lang="en-US" sz="2400" dirty="false">
+              <a:solidFill>
+                <a:schemeClr val="accent6"/>
+              </a:solidFill>
+              <a:latin typeface="MS Shell Dlg 2" panose="020B0604030504040204" pitchFamily="34" charset="0"/>
+            </a:endParaRPr>
+          </a:p>
+        </p:txBody>
+      </p:sp>
+      <p:sp>
+        <p:nvSpPr>
+          <p:cNvPr id="22" name="Rectangle 21">
+            <a:extLst>
+              <a:ext uri="{FF2B5EF4-FFF2-40B4-BE49-F238E27FC236}">
+                <a16:creationId id="{D0BE3D13-5BE5-4B05-AFCF-2A2E059D29F8}"/>
+              </a:ext>
+              <a:ext uri="{C183D7F6-B498-43B3-948B-1728B52AA6E4}">
+                <adec:decorative val="true"/>
+              </a:ext>
+            </a:extLst>
+          </p:cNvPr>
+          <p:cNvSpPr>
+            <a:spLocks noTextEdit="true" noGrp="true" noRot="true" noChangeAspect="true" noMove="true" noResize="true" noEditPoints="true" noAdjustHandles="true" noChangeArrowheads="true" noChangeShapeType="true"/>
+          </p:cNvSpPr>
+          <p:nvPr>
+            <p:extLst>
+              <p:ext uri="{386F3935-93C4-4BCD-93E2-E3B085C9AB24}">
+                <p16:designElem val="true"/>
+              </p:ext>
+            </p:extLst>
+          </p:nvPr>
+        </p:nvSpPr>
+        <p:spPr>
+          <a:xfrm>
+            <a:off x="0" y="-1"/>
+            <a:ext cx="12192000" cy="6858001"/>
+          </a:xfrm>
+          <a:prstGeom prst="rect">
+            <a:avLst/>
+          </a:prstGeom>
+          <a:solidFill>
+            <a:srgbClr val="FFFFFF"/>
+          </a:solidFill>
+          <a:ln>
+            <a:noFill/>
+          </a:ln>
+        </p:spPr>
+        <p:style>
+          <a:lnRef idx="2">
+            <a:schemeClr val="accent1">
+              <a:shade val="50000"/>
+            </a:schemeClr>
+          </a:lnRef>
+          <a:fillRef idx="1">
+            <a:schemeClr val="accent1"/>
+          </a:fillRef>
+          <a:effectRef idx="0">
+            <a:schemeClr val="accent1"/>
+          </a:effectRef>
+          <a:fontRef idx="minor">
+            <a:schemeClr val="lt1"/>
+          </a:fontRef>
+        </p:style>
+        <p:txBody>
+          <a:bodyPr rtlCol="false" anchor="ctr"/>
+          <a:lstStyle/>
+          <a:p>
+            <a:pPr algn="ctr"/>
+            <a:endParaRPr lang="en-US"/>
+          </a:p>
+        </p:txBody>
+      </p:sp>
+      <p:sp>
+        <p:nvSpPr>
+          <p:cNvPr id="24" name="Oval 23">
+            <a:extLst>
+              <a:ext uri="{FF2B5EF4-FFF2-40B4-BE49-F238E27FC236}">
+                <a16:creationId id="{1AC85C80-0175-4214-A13D-03C224658C16}"/>
+              </a:ext>
+              <a:ext uri="{C183D7F6-B498-43B3-948B-1728B52AA6E4}">
+                <adec:decorative val="true"/>
+              </a:ext>
+            </a:extLst>
+          </p:cNvPr>
+          <p:cNvSpPr>
+            <a:spLocks noTextEdit="true" noGrp="true" noRot="true" noChangeAspect="true" noMove="true" noResize="true" noEditPoints="true" noAdjustHandles="true" noChangeArrowheads="true" noChangeShapeType="true"/>
+          </p:cNvSpPr>
+          <p:nvPr>
+            <p:extLst>
+              <p:ext uri="{386F3935-93C4-4BCD-93E2-E3B085C9AB24}">
+                <p16:designElem val="true"/>
+              </p:ext>
+            </p:extLst>
+          </p:nvPr>
+        </p:nvSpPr>
+        <p:spPr>
+          <a:xfrm>
+            <a:off x="1609124" y="487443"/>
+            <a:ext cx="5841548" cy="5841548"/>
+          </a:xfrm>
+          <a:prstGeom prst="ellipse">
+            <a:avLst/>
+          </a:prstGeom>
+          <a:solidFill>
+            <a:schemeClr val="accent1">
+              <a:lumMod val="40000"/>
+              <a:lumOff val="60000"/>
+            </a:schemeClr>
+          </a:solidFill>
+          <a:ln>
+            <a:noFill/>
+          </a:ln>
+        </p:spPr>
+        <p:style>
+          <a:lnRef idx="2">
+            <a:schemeClr val="accent1">
+              <a:shade val="50000"/>
+            </a:schemeClr>
+          </a:lnRef>
+          <a:fillRef idx="1">
+            <a:schemeClr val="accent1"/>
+          </a:fillRef>
+          <a:effectRef idx="0">
+            <a:schemeClr val="accent1"/>
+          </a:effectRef>
+          <a:fontRef idx="minor">
+            <a:schemeClr val="lt1"/>
+          </a:fontRef>
+        </p:style>
+        <p:txBody>
+          <a:bodyPr rtlCol="false" anchor="ctr"/>
+          <a:lstStyle/>
+          <a:p>
+            <a:pPr algn="ctr"/>
+            <a:endParaRPr lang="en-US">
+              <a:solidFill>
+                <a:schemeClr val="accent1">
+                  <a:lumMod val="40000"/>
+                  <a:lumOff val="60000"/>
+                </a:schemeClr>
+              </a:solidFill>
+            </a:endParaRPr>
+          </a:p>
+        </p:txBody>
+      </p:sp>
+      <p:pic>
+        <p:nvPicPr>
+          <p:cNvPr id="26" name="Picture 25">
+            <a:extLst>
+              <a:ext uri="{FF2B5EF4-FFF2-40B4-BE49-F238E27FC236}">
+                <a16:creationId id="{15ADB788-8569-409E-862D-665AD53C9904}"/>
+              </a:ext>
+              <a:ext uri="{C183D7F6-B498-43B3-948B-1728B52AA6E4}">
+                <adec:decorative val="true"/>
+              </a:ext>
+            </a:extLst>
+          </p:cNvPr>
+          <p:cNvPicPr>
+            <a:picLocks noCrop="true" noGrp="true" noRot="true" noChangeAspect="true" noMove="true" noResize="true" noEditPoints="true" noAdjustHandles="true" noChangeArrowheads="true" noChangeShapeType="true"/>
+          </p:cNvPicPr>
+          <p:nvPr>
+            <p:extLst>
+              <p:ext uri="{386F3935-93C4-4BCD-93E2-E3B085C9AB24}">
+                <p16:designElem val="true"/>
+              </p:ext>
+            </p:extLst>
+          </p:nvPr>
+        </p:nvPicPr>
+        <p:blipFill>
+          <a:blip r:embed="rId3">
+            <a:extLst>
+              <a:ext uri="{28A0092B-C50C-407E-A947-70E740481C1C}">
+                <a14:useLocalDpi val="false"/>
+              </a:ext>
+            </a:extLst>
+          </a:blip>
+          <a:stretch>
+            <a:fillRect/>
+          </a:stretch>
+        </p:blipFill>
+        <p:spPr>
+          <a:xfrm>
+            <a:off x="2133" y="0"/>
+            <a:ext cx="12189867" cy="6858000"/>
+          </a:xfrm>
+          <a:prstGeom prst="rect">
+            <a:avLst/>
+          </a:prstGeom>
+        </p:spPr>
+      </p:pic>
+      <p:sp>
+        <p:nvSpPr>
+          <p:cNvPr id="28" name="Rectangle 27">
+            <a:extLst>
+              <a:ext uri="{FF2B5EF4-FFF2-40B4-BE49-F238E27FC236}">
+                <a16:creationId id="{76562092-3AA7-4EF0-9007-C44F879A1308}"/>
+              </a:ext>
+              <a:ext uri="{C183D7F6-B498-43B3-948B-1728B52AA6E4}">
+                <adec:decorative val="true"/>
+              </a:ext>
+            </a:extLst>
+          </p:cNvPr>
+          <p:cNvSpPr>
+            <a:spLocks noTextEdit="true" noGrp="true" noRot="true" noChangeAspect="true" noMove="true" noResize="true" noEditPoints="true" noAdjustHandles="true" noChangeArrowheads="true" noChangeShapeType="true"/>
+          </p:cNvSpPr>
+          <p:nvPr>
+            <p:extLst>
+              <p:ext uri="{386F3935-93C4-4BCD-93E2-E3B085C9AB24}">
+                <p16:designElem val="true"/>
+              </p:ext>
+            </p:extLst>
+          </p:nvPr>
+        </p:nvSpPr>
+        <p:spPr>
+          <a:xfrm>
+            <a:off x="0" y="0"/>
+            <a:ext cx="964174" cy="6858000"/>
+          </a:xfrm>
+          <a:prstGeom prst="rect">
+            <a:avLst/>
+          </a:prstGeom>
+          <a:solidFill>
+            <a:schemeClr val="tx2"/>
+          </a:solidFill>
+          <a:ln>
+            <a:noFill/>
+          </a:ln>
+        </p:spPr>
+        <p:style>
+          <a:lnRef idx="2">
+            <a:schemeClr val="accent1">
+              <a:shade val="50000"/>
+            </a:schemeClr>
+          </a:lnRef>
+          <a:fillRef idx="1">
+            <a:schemeClr val="accent1"/>
+          </a:fillRef>
+          <a:effectRef idx="0">
+            <a:schemeClr val="accent1"/>
+          </a:effectRef>
+          <a:fontRef idx="minor">
+            <a:schemeClr val="lt1"/>
+          </a:fontRef>
+        </p:style>
+        <p:txBody>
+          <a:bodyPr/>
+          <a:lstStyle/>
+          <a:p>
+            <a:endParaRPr lang="en-RO"/>
+          </a:p>
+        </p:txBody>
+      </p:sp>
+      <p:sp>
+        <p:nvSpPr>
+          <p:cNvPr id="30" name="Right Triangle 29">
+            <a:extLst>
+              <a:ext uri="{FF2B5EF4-FFF2-40B4-BE49-F238E27FC236}">
+                <a16:creationId id="{2663C086-1480-4E81-BD6F-3E43A4C38C62}"/>
+              </a:ext>
+              <a:ext uri="{C183D7F6-B498-43B3-948B-1728B52AA6E4}">
+                <adec:decorative val="true"/>
+              </a:ext>
+            </a:extLst>
+          </p:cNvPr>
+          <p:cNvSpPr>
+            <a:spLocks noTextEdit="true" noGrp="true" noRot="true" noChangeAspect="true" noMove="true" noResize="true" noEditPoints="true" noAdjustHandles="true" noChangeArrowheads="true" noChangeShapeType="true"/>
+          </p:cNvSpPr>
+          <p:nvPr>
+            <p:extLst>
+              <p:ext uri="{386F3935-93C4-4BCD-93E2-E3B085C9AB24}">
+                <p16:designElem val="true"/>
+              </p:ext>
+            </p:extLst>
+          </p:nvPr>
+        </p:nvSpPr>
+        <p:spPr>
+          <a:xfrm rot="16200000" flipH="true">
+            <a:off x="2585313" y="2747897"/>
+            <a:ext cx="353147" cy="353147"/>
+          </a:xfrm>
+          <a:prstGeom prst="rtTriangle">
+            <a:avLst/>
+          </a:prstGeom>
+          <a:solidFill>
+            <a:schemeClr val="tx2"/>
+          </a:solidFill>
+          <a:ln>
+            <a:noFill/>
+          </a:ln>
+        </p:spPr>
+        <p:style>
+          <a:lnRef idx="2">
+            <a:schemeClr val="accent1">
+              <a:shade val="50000"/>
+            </a:schemeClr>
+          </a:lnRef>
+          <a:fillRef idx="1">
+            <a:schemeClr val="accent1"/>
+          </a:fillRef>
+          <a:effectRef idx="0">
+            <a:schemeClr val="accent1"/>
+          </a:effectRef>
+          <a:fontRef idx="minor">
+            <a:schemeClr val="lt1"/>
+          </a:fontRef>
+        </p:style>
+        <p:txBody>
+          <a:bodyPr rtlCol="false" anchor="ctr"/>
+          <a:lstStyle/>
+          <a:p>
+            <a:pPr algn="ctr"/>
+            <a:endParaRPr lang="en-US"/>
+          </a:p>
+        </p:txBody>
+      </p:sp>
+      <p:sp>
+        <p:nvSpPr>
+          <p:cNvPr id="4" name="Title 3">
+            <a:extLst>
+              <a:ext uri="{FF2B5EF4-FFF2-40B4-BE49-F238E27FC236}">
+                <a16:creationId id="{A8791F5F-F5E6-BA9D-F3FD-AF1F88F248AC}"/>
+              </a:ext>
+            </a:extLst>
+          </p:cNvPr>
+          <p:cNvSpPr>
+            <a:spLocks noGrp="true"/>
+          </p:cNvSpPr>
+          <p:nvPr>
+            <p:ph type="title"/>
+          </p:nvPr>
+        </p:nvSpPr>
+        <p:spPr/>
+        <p:txBody>
+          <a:bodyPr/>
+          <a:lstStyle/>
+          <a:p>
+            <a:endParaRPr lang="en-RO"/>
+          </a:p>
+        </p:txBody>
+      </p:sp>
+      <p:graphicFrame>
+        <p:nvGraphicFramePr>
+          <p:cNvPr id="5" name="Table 4">
+            <a:extLst>
+              <a:ext uri="{FF2B5EF4-FFF2-40B4-BE49-F238E27FC236}">
+                <a16:creationId id="{FF5EC404-4E6C-0431-38FC-7E93500C69EC}"/>
+              </a:ext>
+            </a:extLst>
+          </p:cNvPr>
+          <p:cNvGraphicFramePr>
+            <a:graphicFrameLocks noGrp="true"/>
+          </p:cNvGraphicFramePr>
+          <p:nvPr>
+            <p:extLst>
+              <p:ext uri="{D42A27DB-BD31-4B8C-83A1-F6EECF244321}">
+                <p14:modId val="1886425378"/>
+              </p:ext>
+            </p:extLst>
+          </p:nvPr>
+        </p:nvGraphicFramePr>
+        <p:xfrm>
+          <a:off x="3718296" y="5189221"/>
+          <a:ext cx="8127999" cy="1112520"/>
+        </p:xfrm>
+        <a:graphic>
+          <a:graphicData uri="http://schemas.openxmlformats.org/drawingml/2006/table">
+            <a:tbl>
+              <a:tblPr firstRow="true" bandRow="true">
+                <a:tableStyleId>{5C22544A-7EE6-4342-B048-85BDC9FD1C3A}</a:tableStyleId>
+              </a:tblPr>
+              <a:tblGrid>
+                <a:gridCol w="2709333">
+                  <a:extLst>
+                    <a:ext uri="{9D8B030D-6E8A-4147-A177-3AD203B41FA5}">
+                      <a16:colId val="175749159"/>
+                    </a:ext>
+                  </a:extLst>
+                </a:gridCol>
+                <a:gridCol w="2709333">
+                  <a:extLst>
+                    <a:ext uri="{9D8B030D-6E8A-4147-A177-3AD203B41FA5}">
+                      <a16:colId val="3437409440"/>
+                    </a:ext>
+                  </a:extLst>
+                </a:gridCol>
+                <a:gridCol w="2709333">
+                  <a:extLst>
+                    <a:ext uri="{9D8B030D-6E8A-4147-A177-3AD203B41FA5}">
+                      <a16:colId val="2467139836"/>
+                    </a:ext>
+                  </a:extLst>
+                </a:gridCol>
+              </a:tblGrid>
+              <a:tr h="370840">
+                <a:tc>
+                  <a:txBody>
+                    <a:bodyPr/>
+                    <a:lstStyle/>
+                    <a:p>
+                      <a:r>
+                        <a:rPr lang="en-RO" dirty="false"/>
+                        <a:t>First Name</a:t>
+                      </a:r>
+                    </a:p>
+                  </a:txBody>
+                  <a:tcPr/>
+                </a:tc>
+                <a:tc>
+                  <a:txBody>
+                    <a:bodyPr/>
+                    <a:lstStyle/>
+                    <a:p>
+                      <a:r>
+                        <a:rPr lang="en-RO" dirty="false"/>
+                        <a:t>Last Name</a:t>
+                      </a:r>
+                    </a:p>
+                  </a:txBody>
+                  <a:tcPr/>
+                </a:tc>
+                <a:tc>
+                  <a:txBody>
+                    <a:bodyPr/>
+                    <a:lstStyle/>
+                    <a:p>
+                      <a:r>
+                        <a:rPr lang="en-RO" dirty="false"/>
+                        <a:t>Last</a:t>
+                      </a:r>
+                    </a:p>
+                  </a:txBody>
+                  <a:tcPr/>
+                </a:tc>
+                <a:extLst>
+                  <a:ext uri="{0D108BD9-81ED-4DB2-BD59-A6C34878D82A}">
+                    <a16:rowId val="2632008680"/>
+                  </a:ext>
+                </a:extLst>
+              </a:tr>
+              <a:tr h="370840">
+                <a:tc>
+                  <a:txBody>
+                    <a:bodyPr/>
+                    <a:lstStyle/>
+                    <a:p>
+                      <a:r>
+                        <a:rPr lang="en-RO" dirty="false"/>
+                        <a:t>Aron</a:t>
+                      </a:r>
+                    </a:p>
+                  </a:txBody>
+                  <a:tcPr/>
+                </a:tc>
+                <a:tc>
+                  <a:txBody>
+                    <a:bodyPr/>
+                    <a:lstStyle/>
+                    <a:p>
+                      <a:r>
+                        <a:rPr lang="en-RO" dirty="false"/>
+                        <a:t>Sipos</a:t>
+                      </a:r>
+                    </a:p>
+                  </a:txBody>
+                  <a:tcPr/>
+                </a:tc>
+                <a:tc>
+                  <a:txBody>
+                    <a:bodyPr/>
+                    <a:lstStyle/>
+                    <a:p>
+                      <a:r>
+                        <a:rPr lang="en-RO" dirty="false"/>
+                        <a:t>Last message</a:t>
+                      </a:r>
+                    </a:p>
+                  </a:txBody>
+                  <a:tcPr/>
+                </a:tc>
+                <a:extLst>
+                  <a:ext uri="{0D108BD9-81ED-4DB2-BD59-A6C34878D82A}">
+                    <a16:rowId val="80271610"/>
+                  </a:ext>
+                </a:extLst>
+              </a:tr>
+              <a:tr h="370840">
+                <a:tc>
+                  <a:txBody>
+                    <a:bodyPr/>
+                    <a:lstStyle/>
+                    <a:p>
+                      <a:endParaRPr lang="en-RO"/>
+                    </a:p>
+                  </a:txBody>
+                  <a:tcPr/>
+                </a:tc>
+                <a:tc>
+                  <a:txBody>
+                    <a:bodyPr/>
+                    <a:lstStyle/>
+                    <a:p>
+                      <a:endParaRPr lang="en-RO"/>
+                    </a:p>
+                  </a:txBody>
+                  <a:tcPr/>
+                </a:tc>
+                <a:tc>
+                  <a:txBody>
+                    <a:bodyPr/>
+                    <a:lstStyle/>
+                    <a:p>
+                      <a:endParaRPr lang="en-RO" dirty="false"/>
+                    </a:p>
+                  </a:txBody>
+                  <a:tcPr/>
+                </a:tc>
+                <a:extLst>
+                  <a:ext uri="{0D108BD9-81ED-4DB2-BD59-A6C34878D82A}">
+                    <a16:rowId val="959612828"/>
+                  </a:ext>
+                </a:extLst>
+              </a:tr>
+            </a:tbl>
+          </a:graphicData>
+        </a:graphic>
+      </p:graphicFrame>
+    </p:spTree>
+    <p:extLst>
+      <p:ext uri="{BB962C8B-B14F-4D97-AF65-F5344CB8AC3E}">
+        <p14:creationId val="2483717144"/>
+      </p:ext>
+    </p:extLst>
+  </p:cSld>
+  <p:clrMapOvr>
+    <a:overrideClrMapping bg1="lt1" tx1="dk1" bg2="lt2" tx2="dk2" accent1="accent1" accent2="accent2" accent3="accent3" accent4="accent4" accent5="accent5" accent6="accent6" hlink="hlink" folHlink="folHlink"/>
+  </p:clrMapOvr>
+</p:sld>
+</file>
+
+<file path=ppt/slides/slide4.xml><?xml version="1.0" encoding="utf-8"?>
+<p:sld xmlns:r="http://schemas.openxmlformats.org/officeDocument/2006/relationships" xmlns:a="http://schemas.openxmlformats.org/drawingml/2006/main" xmlns:p="http://schemas.openxmlformats.org/presentationml/2006/main" xmlns:mc="http://schemas.openxmlformats.org/markup-compatibility/2006" xmlns:c="http://schemas.openxmlformats.org/drawingml/2006/chart" xmlns:cdr="http://schemas.openxmlformats.org/drawingml/2006/chartDrawing" xmlns:c14="http://schemas.microsoft.com/office/drawing/2007/8/2/chart" xmlns:dgm="http://schemas.openxmlformats.org/drawingml/2006/diagram" xmlns:pic="http://schemas.openxmlformats.org/drawingml/2006/picture" xmlns:wp="http://schemas.openxmlformats.org/drawingml/2006/wordprocessingDrawing" xmlns:wp14="http://schemas.microsoft.com/office/word/2010/wordprocessingDrawing" xmlns:xdr="http://schemas.openxmlformats.org/drawingml/2006/spreadsheetDrawing" xmlns:dsp="http://schemas.microsoft.com/office/drawing/2008/diagram" xmlns:p14="http://schemas.microsoft.com/office/powerpoint/2010/main" xmlns:a14="http://schemas.microsoft.com/office/drawing/2010/main" xmlns:p15="http://schemas.microsoft.com/office/powerpoint/2012/main" xmlns:p166="http://schemas.microsoft.com/office/powerpoint/2016/6/main" xmlns:a13cmd="http://schemas.microsoft.com/office/drawing/2013/main/command" xmlns:p13cmd="http://schemas.microsoft.com/office/powerpoint/2013/main/command" xmlns:p1510="http://schemas.microsoft.com/office/powerpoint/2015/10/main" xmlns:psez="http://schemas.microsoft.com/office/powerpoint/2016/sectionzoom" xmlns:pslz="http://schemas.microsoft.com/office/powerpoint/2016/slidezoom" xmlns:psuz="http://schemas.microsoft.com/office/powerpoint/2016/summaryzoom" xmlns:p173="http://schemas.microsoft.com/office/powerpoint/2017/3/main" xmlns:b="http://schemas.openxmlformats.org/officeDocument/2006/bibliography" xmlns:msink="http://schemas.microsoft.com/ink/2010/main" xmlns:cdr14="http://schemas.microsoft.com/office/drawing/2010/chartDrawing" xmlns:c15="http://schemas.microsoft.com/office/drawing/2012/chart" xmlns:cs="http://schemas.microsoft.com/office/drawing/2012/chartStyle" xmlns:ns30="http://www.w3.org/1998/Math/MathML" xmlns:ns31="http://www.w3.org/2003/InkML" xmlns:cx="http://schemas.microsoft.com/office/drawing/2014/chartex" xmlns:c16="http://schemas.microsoft.com/office/drawing/2014/chart" xmlns:dgm1611="http://schemas.microsoft.com/office/drawing/2016/11/diagram" xmlns:c173="http://schemas.microsoft.com/office/drawing/2017/03/chart" xmlns:am3d="http://schemas.microsoft.com/office/drawing/2017/model3d" xmlns:an18="http://schemas.microsoft.com/office/drawing/2018/animation" xmlns:anam3d="http://schemas.microsoft.com/office/drawing/2018/animation/model3d" xmlns:iact="http://schemas.microsoft.com/office/powerpoint/2014/inkAction" xmlns:thm15="http://schemas.microsoft.com/office/thememl/2012/main" xmlns:wetp="http://schemas.microsoft.com/office/webextensions/taskpanes/2010/11" xmlns:we="http://schemas.microsoft.com/office/webextensions/webextension/2010/11" xmlns:comp="http://schemas.openxmlformats.org/drawingml/2006/compatibility" xmlns:lc="http://schemas.openxmlformats.org/drawingml/2006/lockedCanvas" xmlns:p159="http://schemas.microsoft.com/office/powerpoint/2015/09/main" xmlns:p16="http://schemas.microsoft.com/office/powerpoint/2015/main" xmlns:p1710="http://schemas.microsoft.com/office/powerpoint/2017/10/main" xmlns:p184="http://schemas.microsoft.com/office/powerpoint/2018/4/main" xmlns:dgm14="http://schemas.microsoft.com/office/drawing/2010/diagram" xmlns:a15="http://schemas.microsoft.com/office/drawing/2012/main" xmlns:pic14="http://schemas.microsoft.com/office/drawing/2010/picture" xmlns:c16ac="http://schemas.microsoft.com/office/drawing/2014/chart/ac" xmlns:a16="http://schemas.microsoft.com/office/drawing/2014/main" xmlns:a1611="http://schemas.microsoft.com/office/drawing/2016/11/main" xmlns:dgm1612="http://schemas.microsoft.com/office/drawing/2016/12/diagram" xmlns:a16svg="http://schemas.microsoft.com/office/drawing/2016/SVG/main" xmlns:adec="http://schemas.microsoft.com/office/drawing/2017/decorative" xmlns:a18hc="http://schemas.microsoft.com/office/drawing/2018/hyperlinkcolor" xmlns:v="urn:schemas-microsoft-com:vml">
+  <p:cSld>
+    <p:bg>
+      <p:bgPr>
+        <a:solidFill>
+          <a:schemeClr val="bg1"/>
+        </a:solidFill>
+        <a:effectLst/>
+      </p:bgPr>
+    </p:bg>
+    <p:spTree>
+      <p:nvGrpSpPr>
+        <p:cNvPr id="1" name=""/>
+        <p:cNvGrpSpPr/>
+        <p:nvPr/>
+      </p:nvGrpSpPr>
+      <p:grpSpPr>
+        <a:xfrm>
+          <a:off x="0" y="0"/>
+          <a:ext cx="0" cy="0"/>
+          <a:chOff x="0" y="0"/>
+          <a:chExt cx="0" cy="0"/>
+        </a:xfrm>
+      </p:grpSpPr>
+      <p:pic>
+        <p:nvPicPr>
+          <p:cNvPr id="8" name="Picture 7">
+            <a:extLst>
+              <a:ext uri="{FF2B5EF4-FFF2-40B4-BE49-F238E27FC236}">
+                <a16:creationId id="{3DBBA26C-89C3-411F-9753-606A413F89AF}"/>
+              </a:ext>
+              <a:ext uri="{C183D7F6-B498-43B3-948B-1728B52AA6E4}">
+                <adec:decorative val="true"/>
+              </a:ext>
+            </a:extLst>
+          </p:cNvPr>
+          <p:cNvPicPr>
+            <a:picLocks noCrop="true" noGrp="true" noRot="true" noChangeAspect="true" noMove="true" noResize="true" noEditPoints="true" noAdjustHandles="true" noChangeArrowheads="true" noChangeShapeType="true"/>
+          </p:cNvPicPr>
+          <p:nvPr>
+            <p:extLst>
+              <p:ext uri="{386F3935-93C4-4BCD-93E2-E3B085C9AB24}">
+                <p16:designElem val="true"/>
+              </p:ext>
+            </p:extLst>
+          </p:nvPr>
+        </p:nvPicPr>
+        <p:blipFill>
+          <a:blip r:embed="rId2">
+            <a:extLst>
+              <a:ext uri="{28A0092B-C50C-407E-A947-70E740481C1C}">
+                <a14:useLocalDpi val="false"/>
+              </a:ext>
+            </a:extLst>
+          </a:blip>
+          <a:stretch>
+            <a:fillRect/>
+          </a:stretch>
+        </p:blipFill>
+        <p:spPr>
+          <a:xfrm>
+            <a:off x="2831794" y="2105202"/>
+            <a:ext cx="9360205" cy="4752798"/>
+          </a:xfrm>
+          <a:prstGeom prst="rect">
+            <a:avLst/>
+          </a:prstGeom>
+        </p:spPr>
+      </p:pic>
+      <p:pic>
+        <p:nvPicPr>
+          <p:cNvPr id="10" name="Picture 9">
+            <a:extLst>
+              <a:ext uri="{FF2B5EF4-FFF2-40B4-BE49-F238E27FC236}">
+                <a16:creationId id="{EEAD2215-6311-4D1C-B6B5-F57CB6BFCBCA}"/>
+              </a:ext>
+              <a:ext uri="{C183D7F6-B498-43B3-948B-1728B52AA6E4}">
+                <adec:decorative val="true"/>
+              </a:ext>
+            </a:extLst>
+          </p:cNvPr>
+          <p:cNvPicPr>
+            <a:picLocks noCrop="true" noGrp="true" noRot="true" noChangeAspect="true" noMove="true" noResize="true" noEditPoints="true" noAdjustHandles="true" noChangeArrowheads="true" noChangeShapeType="true"/>
+          </p:cNvPicPr>
+          <p:nvPr>
+            <p:extLst>
+              <p:ext uri="{386F3935-93C4-4BCD-93E2-E3B085C9AB24}">
+                <p16:designElem val="true"/>
+              </p:ext>
+            </p:extLst>
+          </p:nvPr>
+        </p:nvPicPr>
+        <p:blipFill>
+          <a:blip r:embed="rId3">
+            <a:extLst>
+              <a:ext uri="{28A0092B-C50C-407E-A947-70E740481C1C}">
+                <a14:useLocalDpi val="false"/>
+              </a:ext>
+            </a:extLst>
+          </a:blip>
+          <a:stretch>
+            <a:fillRect/>
+          </a:stretch>
+        </p:blipFill>
+        <p:spPr>
+          <a:xfrm>
+            <a:off x="0" y="0"/>
+            <a:ext cx="12189867" cy="6858000"/>
+          </a:xfrm>
+          <a:prstGeom prst="rect">
+            <a:avLst/>
+          </a:prstGeom>
+        </p:spPr>
+      </p:pic>
+      <p:sp>
+        <p:nvSpPr>
+          <p:cNvPr id="12" name="Rectangle 11">
+            <a:extLst>
+              <a:ext uri="{FF2B5EF4-FFF2-40B4-BE49-F238E27FC236}">
+                <a16:creationId id="{7BA5DE79-30D1-4A10-8DB9-0A6E523A9723}"/>
+              </a:ext>
+              <a:ext uri="{C183D7F6-B498-43B3-948B-1728B52AA6E4}">
+                <adec:decorative val="true"/>
+              </a:ext>
+            </a:extLst>
+          </p:cNvPr>
+          <p:cNvSpPr>
+            <a:spLocks noTextEdit="true" noGrp="true" noRot="true" noChangeAspect="true" noMove="true" noResize="true" noEditPoints="true" noAdjustHandles="true" noChangeArrowheads="true" noChangeShapeType="true"/>
+          </p:cNvSpPr>
+          <p:nvPr>
+            <p:extLst>
+              <p:ext uri="{386F3935-93C4-4BCD-93E2-E3B085C9AB24}">
+                <p16:designElem val="true"/>
+              </p:ext>
+            </p:extLst>
+          </p:nvPr>
+        </p:nvSpPr>
+        <p:spPr>
+          <a:xfrm>
+            <a:off x="0" y="0"/>
+            <a:ext cx="964174" cy="6858000"/>
+          </a:xfrm>
+          <a:prstGeom prst="rect">
+            <a:avLst/>
+          </a:prstGeom>
+          <a:solidFill>
+            <a:schemeClr val="bg2"/>
+          </a:solidFill>
+          <a:ln>
+            <a:noFill/>
+          </a:ln>
+        </p:spPr>
+        <p:style>
+          <a:lnRef idx="2">
+            <a:schemeClr val="accent1">
+              <a:shade val="50000"/>
+            </a:schemeClr>
+          </a:lnRef>
+          <a:fillRef idx="1">
+            <a:schemeClr val="accent1"/>
+          </a:fillRef>
+          <a:effectRef idx="0">
+            <a:schemeClr val="accent1"/>
+          </a:effectRef>
+          <a:fontRef idx="minor">
+            <a:schemeClr val="lt1"/>
+          </a:fontRef>
+        </p:style>
+        <p:txBody>
+          <a:bodyPr/>
+          <a:lstStyle/>
+          <a:p>
+            <a:endParaRPr lang="en-RO"/>
+          </a:p>
+        </p:txBody>
+      </p:sp>
+      <p:sp>
+        <p:nvSpPr>
+          <p:cNvPr id="14" name="Rectangle 13">
+            <a:extLst>
+              <a:ext uri="{FF2B5EF4-FFF2-40B4-BE49-F238E27FC236}">
+                <a16:creationId id="{9ABD0D63-D23F-4AE7-8270-4185EF9C1C25}"/>
+              </a:ext>
+              <a:ext uri="{C183D7F6-B498-43B3-948B-1728B52AA6E4}">
+                <adec:decorative val="true"/>
+              </a:ext>
+            </a:extLst>
+          </p:cNvPr>
+          <p:cNvSpPr>
+            <a:spLocks noTextEdit="true" noGrp="true" noRot="true" noChangeAspect="true" noMove="true" noResize="true" noEditPoints="true" noAdjustHandles="true" noChangeArrowheads="true" noChangeShapeType="true"/>
+          </p:cNvSpPr>
+          <p:nvPr>
+            <p:extLst>
+              <p:ext uri="{386F3935-93C4-4BCD-93E2-E3B085C9AB24}">
+                <p16:designElem val="true"/>
+              </p:ext>
+            </p:extLst>
+          </p:nvPr>
+        </p:nvSpPr>
+        <p:spPr>
+          <a:xfrm>
+            <a:off x="962042" y="0"/>
+            <a:ext cx="45719" cy="6858000"/>
+          </a:xfrm>
+          <a:prstGeom prst="rect">
+            <a:avLst/>
+          </a:prstGeom>
+          <a:solidFill>
+            <a:schemeClr val="accent6"/>
+          </a:solidFill>
+          <a:ln>
+            <a:noFill/>
+          </a:ln>
+        </p:spPr>
+        <p:style>
+          <a:lnRef idx="2">
+            <a:schemeClr val="accent1">
+              <a:shade val="50000"/>
+            </a:schemeClr>
+          </a:lnRef>
+          <a:fillRef idx="1">
+            <a:schemeClr val="accent1"/>
+          </a:fillRef>
+          <a:effectRef idx="0">
+            <a:schemeClr val="accent1"/>
+          </a:effectRef>
+          <a:fontRef idx="minor">
+            <a:schemeClr val="lt1"/>
+          </a:fontRef>
+        </p:style>
+        <p:txBody>
+          <a:bodyPr/>
+          <a:lstStyle/>
+          <a:p>
+            <a:endParaRPr lang="en-RO"/>
+          </a:p>
+        </p:txBody>
+      </p:sp>
+      <p:sp>
+        <p:nvSpPr>
+          <p:cNvPr id="16" name="Rectangle 15">
+            <a:extLst>
+              <a:ext uri="{FF2B5EF4-FFF2-40B4-BE49-F238E27FC236}">
+                <a16:creationId id="{72168E9E-94E9-4BE3-B88C-C8A468117753}"/>
+              </a:ext>
+              <a:ext uri="{C183D7F6-B498-43B3-948B-1728B52AA6E4}">
+                <adec:decorative val="true"/>
+              </a:ext>
+            </a:extLst>
+          </p:cNvPr>
+          <p:cNvSpPr>
+            <a:spLocks noTextEdit="true" noGrp="true" noRot="true" noChangeAspect="true" noMove="true" noResize="true" noEditPoints="true" noAdjustHandles="true" noChangeArrowheads="true" noChangeShapeType="true"/>
+          </p:cNvSpPr>
+          <p:nvPr>
+            <p:extLst>
+              <p:ext uri="{386F3935-93C4-4BCD-93E2-E3B085C9AB24}">
+                <p16:designElem val="true"/>
+              </p:ext>
+            </p:extLst>
+          </p:nvPr>
+        </p:nvSpPr>
+        <p:spPr>
+          <a:xfrm>
+            <a:off x="1007533" y="0"/>
+            <a:ext cx="7934348" cy="6858000"/>
+          </a:xfrm>
+          <a:prstGeom prst="rect">
+            <a:avLst/>
+          </a:prstGeom>
+          <a:solidFill>
+            <a:schemeClr val="bg2">
+              <a:alpha val="92000"/>
+            </a:schemeClr>
+          </a:solidFill>
+          <a:ln>
+            <a:noFill/>
+          </a:ln>
+        </p:spPr>
+        <p:style>
+          <a:lnRef idx="2">
+            <a:schemeClr val="accent1">
+              <a:shade val="50000"/>
+            </a:schemeClr>
+          </a:lnRef>
+          <a:fillRef idx="1">
+            <a:schemeClr val="accent1"/>
+          </a:fillRef>
+          <a:effectRef idx="0">
+            <a:schemeClr val="accent1"/>
+          </a:effectRef>
+          <a:fontRef idx="minor">
+            <a:schemeClr val="lt1"/>
+          </a:fontRef>
+        </p:style>
+        <p:txBody>
+          <a:bodyPr/>
+          <a:lstStyle/>
+          <a:p>
+            <a:endParaRPr lang="en-RO"/>
+          </a:p>
+        </p:txBody>
+      </p:sp>
+      <p:sp>
+        <p:nvSpPr>
+          <p:cNvPr id="18" name="Rectangle 17">
+            <a:extLst>
+              <a:ext uri="{FF2B5EF4-FFF2-40B4-BE49-F238E27FC236}">
+                <a16:creationId id="{12107AC1-AA0D-4097-B03D-FD3C632AB886}"/>
+              </a:ext>
+              <a:ext uri="{C183D7F6-B498-43B3-948B-1728B52AA6E4}">
+                <adec:decorative val="true"/>
+              </a:ext>
+            </a:extLst>
+          </p:cNvPr>
+          <p:cNvSpPr>
+            <a:spLocks noTextEdit="true" noGrp="true" noRot="true" noChangeAspect="true" noMove="true" noResize="true" noEditPoints="true" noAdjustHandles="true" noChangeArrowheads="true" noChangeShapeType="true"/>
+          </p:cNvSpPr>
+          <p:nvPr>
+            <p:extLst>
+              <p:ext uri="{386F3935-93C4-4BCD-93E2-E3B085C9AB24}">
+                <p16:designElem val="true"/>
+              </p:ext>
+            </p:extLst>
+          </p:nvPr>
+        </p:nvSpPr>
+        <p:spPr>
+          <a:xfrm>
+            <a:off x="8941881" y="0"/>
+            <a:ext cx="27432" cy="6858000"/>
+          </a:xfrm>
+          <a:prstGeom prst="rect">
+            <a:avLst/>
+          </a:prstGeom>
+          <a:solidFill>
+            <a:schemeClr val="accent6"/>
+          </a:solidFill>
+          <a:ln>
+            <a:noFill/>
+          </a:ln>
+        </p:spPr>
+        <p:style>
+          <a:lnRef idx="2">
+            <a:schemeClr val="accent1">
+              <a:shade val="50000"/>
+            </a:schemeClr>
+          </a:lnRef>
+          <a:fillRef idx="1">
+            <a:schemeClr val="accent1"/>
+          </a:fillRef>
+          <a:effectRef idx="0">
+            <a:schemeClr val="accent1"/>
+          </a:effectRef>
+          <a:fontRef idx="minor">
+            <a:schemeClr val="lt1"/>
+          </a:fontRef>
+        </p:style>
+        <p:txBody>
+          <a:bodyPr/>
+          <a:lstStyle/>
+          <a:p>
+            <a:endParaRPr lang="en-RO"/>
+          </a:p>
+        </p:txBody>
+      </p:sp>
+      <p:sp>
+        <p:nvSpPr>
+          <p:cNvPr id="20" name="TextBox 19">
+            <a:extLst>
+              <a:ext uri="{FF2B5EF4-FFF2-40B4-BE49-F238E27FC236}">
+                <a16:creationId id="{7C8D231A-EC46-4736-B00F-76D307082204}"/>
+              </a:ext>
+              <a:ext uri="{C183D7F6-B498-43B3-948B-1728B52AA6E4}">
+                <adec:decorative val="true"/>
+              </a:ext>
+            </a:extLst>
+          </p:cNvPr>
+          <p:cNvSpPr txBox="true">
+            <a:spLocks noTextEdit="true" noGrp="true" noRot="true" noChangeAspect="true" noMove="true" noResize="true" noEditPoints="true" noAdjustHandles="true" noChangeArrowheads="true" noChangeShapeType="true"/>
+          </p:cNvSpPr>
+          <p:nvPr>
+            <p:extLst>
+              <p:ext uri="{386F3935-93C4-4BCD-93E2-E3B085C9AB24}">
+                <p16:designElem val="true"/>
+              </p:ext>
+            </p:extLst>
+          </p:nvPr>
+        </p:nvSpPr>
+        <p:spPr>
+          <a:xfrm>
+            <a:off x="2191282" y="3262852"/>
+            <a:ext cx="415636" cy="461665"/>
+          </a:xfrm>
+          <a:prstGeom prst="rect">
+            <a:avLst/>
+          </a:prstGeom>
+          <a:noFill/>
+        </p:spPr>
+        <p:txBody>
+          <a:bodyPr wrap="square" rtlCol="false">
+            <a:spAutoFit/>
+          </a:bodyPr>
+          <a:lstStyle/>
+          <a:p>
+            <a:pPr algn="r">
+              <a:spcAft>
+                <a:spcPts val="600"/>
+              </a:spcAft>
+            </a:pPr>
+            <a:r>
+              <a:rPr lang="en-US" sz="2400" dirty="false">
+                <a:solidFill>
+                  <a:schemeClr val="accent6"/>
+                </a:solidFill>
+                <a:latin typeface="Wingdings 3" panose="05040102010807070707" pitchFamily="18" charset="2"/>
+              </a:rPr>
+              <a:t>z</a:t>
+            </a:r>
+            <a:endParaRPr lang="en-US" sz="2400" dirty="false">
+              <a:solidFill>
+                <a:schemeClr val="accent6"/>
+              </a:solidFill>
+              <a:latin typeface="MS Shell Dlg 2" panose="020B0604030504040204" pitchFamily="34" charset="0"/>
+            </a:endParaRPr>
+          </a:p>
+        </p:txBody>
+      </p:sp>
+      <p:sp>
+        <p:nvSpPr>
+          <p:cNvPr id="22" name="Rectangle 21">
+            <a:extLst>
+              <a:ext uri="{FF2B5EF4-FFF2-40B4-BE49-F238E27FC236}">
+                <a16:creationId id="{D0BE3D13-5BE5-4B05-AFCF-2A2E059D29F8}"/>
+              </a:ext>
+              <a:ext uri="{C183D7F6-B498-43B3-948B-1728B52AA6E4}">
+                <adec:decorative val="true"/>
+              </a:ext>
+            </a:extLst>
+          </p:cNvPr>
+          <p:cNvSpPr>
+            <a:spLocks noTextEdit="true" noGrp="true" noRot="true" noChangeAspect="true" noMove="true" noResize="true" noEditPoints="true" noAdjustHandles="true" noChangeArrowheads="true" noChangeShapeType="true"/>
+          </p:cNvSpPr>
+          <p:nvPr>
+            <p:extLst>
+              <p:ext uri="{386F3935-93C4-4BCD-93E2-E3B085C9AB24}">
+                <p16:designElem val="true"/>
+              </p:ext>
+            </p:extLst>
+          </p:nvPr>
+        </p:nvSpPr>
+        <p:spPr>
+          <a:xfrm>
+            <a:off x="0" y="-1"/>
+            <a:ext cx="12192000" cy="6858001"/>
+          </a:xfrm>
+          <a:prstGeom prst="rect">
+            <a:avLst/>
+          </a:prstGeom>
+          <a:solidFill>
+            <a:srgbClr val="FFFFFF"/>
+          </a:solidFill>
+          <a:ln>
+            <a:noFill/>
+          </a:ln>
+        </p:spPr>
+        <p:style>
+          <a:lnRef idx="2">
+            <a:schemeClr val="accent1">
+              <a:shade val="50000"/>
+            </a:schemeClr>
+          </a:lnRef>
+          <a:fillRef idx="1">
+            <a:schemeClr val="accent1"/>
+          </a:fillRef>
+          <a:effectRef idx="0">
+            <a:schemeClr val="accent1"/>
+          </a:effectRef>
+          <a:fontRef idx="minor">
+            <a:schemeClr val="lt1"/>
+          </a:fontRef>
+        </p:style>
+        <p:txBody>
+          <a:bodyPr rtlCol="false" anchor="ctr"/>
+          <a:lstStyle/>
+          <a:p>
+            <a:pPr algn="ctr"/>
+            <a:endParaRPr lang="en-US"/>
+          </a:p>
+        </p:txBody>
+      </p:sp>
+      <p:sp>
+        <p:nvSpPr>
+          <p:cNvPr id="24" name="Oval 23">
+            <a:extLst>
+              <a:ext uri="{FF2B5EF4-FFF2-40B4-BE49-F238E27FC236}">
+                <a16:creationId id="{1AC85C80-0175-4214-A13D-03C224658C16}"/>
+              </a:ext>
+              <a:ext uri="{C183D7F6-B498-43B3-948B-1728B52AA6E4}">
+                <adec:decorative val="true"/>
+              </a:ext>
+            </a:extLst>
+          </p:cNvPr>
+          <p:cNvSpPr>
+            <a:spLocks noTextEdit="true" noGrp="true" noRot="true" noChangeAspect="true" noMove="true" noResize="true" noEditPoints="true" noAdjustHandles="true" noChangeArrowheads="true" noChangeShapeType="true"/>
+          </p:cNvSpPr>
+          <p:nvPr>
+            <p:extLst>
+              <p:ext uri="{386F3935-93C4-4BCD-93E2-E3B085C9AB24}">
+                <p16:designElem val="true"/>
+              </p:ext>
+            </p:extLst>
+          </p:nvPr>
+        </p:nvSpPr>
+        <p:spPr>
+          <a:xfrm>
+            <a:off x="1609124" y="487443"/>
+            <a:ext cx="5841548" cy="5841548"/>
+          </a:xfrm>
+          <a:prstGeom prst="ellipse">
+            <a:avLst/>
+          </a:prstGeom>
+          <a:solidFill>
+            <a:schemeClr val="accent1">
+              <a:lumMod val="40000"/>
+              <a:lumOff val="60000"/>
+            </a:schemeClr>
+          </a:solidFill>
+          <a:ln>
+            <a:noFill/>
+          </a:ln>
+        </p:spPr>
+        <p:style>
+          <a:lnRef idx="2">
+            <a:schemeClr val="accent1">
+              <a:shade val="50000"/>
+            </a:schemeClr>
+          </a:lnRef>
+          <a:fillRef idx="1">
+            <a:schemeClr val="accent1"/>
+          </a:fillRef>
+          <a:effectRef idx="0">
+            <a:schemeClr val="accent1"/>
+          </a:effectRef>
+          <a:fontRef idx="minor">
+            <a:schemeClr val="lt1"/>
+          </a:fontRef>
+        </p:style>
+        <p:txBody>
+          <a:bodyPr rtlCol="false" anchor="ctr"/>
+          <a:lstStyle/>
+          <a:p>
+            <a:pPr algn="ctr"/>
+            <a:endParaRPr lang="en-US">
+              <a:solidFill>
+                <a:schemeClr val="accent1">
+                  <a:lumMod val="40000"/>
+                  <a:lumOff val="60000"/>
+                </a:schemeClr>
+              </a:solidFill>
+            </a:endParaRPr>
+          </a:p>
+        </p:txBody>
+      </p:sp>
+      <p:pic>
+        <p:nvPicPr>
+          <p:cNvPr id="26" name="Picture 25">
+            <a:extLst>
+              <a:ext uri="{FF2B5EF4-FFF2-40B4-BE49-F238E27FC236}">
+                <a16:creationId id="{15ADB788-8569-409E-862D-665AD53C9904}"/>
+              </a:ext>
+              <a:ext uri="{C183D7F6-B498-43B3-948B-1728B52AA6E4}">
+                <adec:decorative val="true"/>
+              </a:ext>
+            </a:extLst>
+          </p:cNvPr>
+          <p:cNvPicPr>
+            <a:picLocks noCrop="true" noGrp="true" noRot="true" noChangeAspect="true" noMove="true" noResize="true" noEditPoints="true" noAdjustHandles="true" noChangeArrowheads="true" noChangeShapeType="true"/>
+          </p:cNvPicPr>
+          <p:nvPr>
+            <p:extLst>
+              <p:ext uri="{386F3935-93C4-4BCD-93E2-E3B085C9AB24}">
+                <p16:designElem val="true"/>
+              </p:ext>
+            </p:extLst>
+          </p:nvPr>
+        </p:nvPicPr>
+        <p:blipFill>
+          <a:blip r:embed="rId3">
+            <a:extLst>
+              <a:ext uri="{28A0092B-C50C-407E-A947-70E740481C1C}">
+                <a14:useLocalDpi val="false"/>
+              </a:ext>
+            </a:extLst>
+          </a:blip>
+          <a:stretch>
+            <a:fillRect/>
+          </a:stretch>
+        </p:blipFill>
+        <p:spPr>
+          <a:xfrm>
+            <a:off x="2133" y="0"/>
+            <a:ext cx="12189867" cy="6858000"/>
+          </a:xfrm>
+          <a:prstGeom prst="rect">
+            <a:avLst/>
+          </a:prstGeom>
+        </p:spPr>
+      </p:pic>
+      <p:sp>
+        <p:nvSpPr>
+          <p:cNvPr id="2" name="Title 1">
+            <a:extLst>
+              <a:ext uri="{FF2B5EF4-FFF2-40B4-BE49-F238E27FC236}">
+                <a16:creationId id="{F1C75026-7554-953C-A03D-4260544B6C33}"/>
+              </a:ext>
+            </a:extLst>
+          </p:cNvPr>
+          <p:cNvSpPr>
+            <a:spLocks noGrp="true"/>
+          </p:cNvSpPr>
+          <p:nvPr>
+            <p:ph type="title"/>
+          </p:nvPr>
+        </p:nvSpPr>
+        <p:spPr>
+          <a:xfrm>
+            <a:off x="3039048" y="2568817"/>
+            <a:ext cx="7155598" cy="3133968"/>
+          </a:xfrm>
+        </p:spPr>
+        <p:txBody>
+          <a:bodyPr vert="horz" lIns="91440" tIns="45720" rIns="91440" bIns="45720" rtlCol="false" anchor="t">
+            <a:normAutofit/>
+          </a:bodyPr>
+          <a:lstStyle/>
+          <a:p>
+            <a:pPr algn="l"/>
+            <a:r>
+              <a:rPr lang="en-US" sz="6600">
+                <a:solidFill>
+                  <a:srgbClr val="1F2D29"/>
+                </a:solidFill>
+              </a:rPr>
+              <a:t>Last message</a:t>
+            </a:r>
+          </a:p>
+        </p:txBody>
+      </p:sp>
+      <p:sp>
+        <p:nvSpPr>
+          <p:cNvPr id="28" name="Rectangle 27">
+            <a:extLst>
+              <a:ext uri="{FF2B5EF4-FFF2-40B4-BE49-F238E27FC236}">
+                <a16:creationId id="{76562092-3AA7-4EF0-9007-C44F879A1308}"/>
+              </a:ext>
+              <a:ext uri="{C183D7F6-B498-43B3-948B-1728B52AA6E4}">
+                <adec:decorative val="true"/>
+              </a:ext>
+            </a:extLst>
+          </p:cNvPr>
+          <p:cNvSpPr>
+            <a:spLocks noTextEdit="true" noGrp="true" noRot="true" noChangeAspect="true" noMove="true" noResize="true" noEditPoints="true" noAdjustHandles="true" noChangeArrowheads="true" noChangeShapeType="true"/>
+          </p:cNvSpPr>
+          <p:nvPr>
+            <p:extLst>
+              <p:ext uri="{386F3935-93C4-4BCD-93E2-E3B085C9AB24}">
+                <p16:designElem val="true"/>
+              </p:ext>
+            </p:extLst>
+          </p:nvPr>
+        </p:nvSpPr>
+        <p:spPr>
+          <a:xfrm>
+            <a:off x="0" y="0"/>
+            <a:ext cx="964174" cy="6858000"/>
+          </a:xfrm>
+          <a:prstGeom prst="rect">
+            <a:avLst/>
+          </a:prstGeom>
+          <a:solidFill>
+            <a:schemeClr val="tx2"/>
+          </a:solidFill>
+          <a:ln>
+            <a:noFill/>
+          </a:ln>
+        </p:spPr>
+        <p:style>
+          <a:lnRef idx="2">
+            <a:schemeClr val="accent1">
+              <a:shade val="50000"/>
+            </a:schemeClr>
+          </a:lnRef>
+          <a:fillRef idx="1">
+            <a:schemeClr val="accent1"/>
+          </a:fillRef>
+          <a:effectRef idx="0">
+            <a:schemeClr val="accent1"/>
+          </a:effectRef>
+          <a:fontRef idx="minor">
+            <a:schemeClr val="lt1"/>
+          </a:fontRef>
+        </p:style>
+        <p:txBody>
+          <a:bodyPr/>
+          <a:lstStyle/>
+          <a:p>
+            <a:endParaRPr lang="en-RO"/>
+          </a:p>
+        </p:txBody>
+      </p:sp>
+      <p:sp>
+        <p:nvSpPr>
+          <p:cNvPr id="30" name="Right Triangle 29">
+            <a:extLst>
+              <a:ext uri="{FF2B5EF4-FFF2-40B4-BE49-F238E27FC236}">
+                <a16:creationId id="{2663C086-1480-4E81-BD6F-3E43A4C38C62}"/>
+              </a:ext>
+              <a:ext uri="{C183D7F6-B498-43B3-948B-1728B52AA6E4}">
+                <adec:decorative val="true"/>
+              </a:ext>
+            </a:extLst>
+          </p:cNvPr>
+          <p:cNvSpPr>
+            <a:spLocks noTextEdit="true" noGrp="true" noRot="true" noChangeAspect="true" noMove="true" noResize="true" noEditPoints="true" noAdjustHandles="true" noChangeArrowheads="true" noChangeShapeType="true"/>
+          </p:cNvSpPr>
+          <p:nvPr>
+            <p:extLst>
+              <p:ext uri="{386F3935-93C4-4BCD-93E2-E3B085C9AB24}">
+                <p16:designElem val="true"/>
+              </p:ext>
+            </p:extLst>
+          </p:nvPr>
+        </p:nvSpPr>
+        <p:spPr>
+          <a:xfrm rot="16200000" flipH="true">
+            <a:off x="2585313" y="2747897"/>
+            <a:ext cx="353147" cy="353147"/>
+          </a:xfrm>
+          <a:prstGeom prst="rtTriangle">
+            <a:avLst/>
+          </a:prstGeom>
+          <a:solidFill>
+            <a:schemeClr val="tx2"/>
+          </a:solidFill>
+          <a:ln>
+            <a:noFill/>
+          </a:ln>
+        </p:spPr>
+        <p:style>
+          <a:lnRef idx="2">
+            <a:schemeClr val="accent1">
+              <a:shade val="50000"/>
+            </a:schemeClr>
+          </a:lnRef>
+          <a:fillRef idx="1">
+            <a:schemeClr val="accent1"/>
+          </a:fillRef>
+          <a:effectRef idx="0">
+            <a:schemeClr val="accent1"/>
+          </a:effectRef>
+          <a:fontRef idx="minor">
+            <a:schemeClr val="lt1"/>
+          </a:fontRef>
+        </p:style>
+        <p:txBody>
+          <a:bodyPr rtlCol="false" anchor="ctr"/>
+          <a:lstStyle/>
+          <a:p>
+            <a:pPr algn="ctr"/>
+            <a:endParaRPr lang="en-US"/>
+          </a:p>
+        </p:txBody>
+      </p:sp>
+    </p:spTree>
+    <p:extLst>
+      <p:ext uri="{BB962C8B-B14F-4D97-AF65-F5344CB8AC3E}">
+        <p14:creationId val="4088765299"/>
       </p:ext>
     </p:extLst>
   </p:cSld>

</xml_diff>